<commit_message>
Raleway all the way!
</commit_message>
<xml_diff>
--- a/sprint_retrospective.pptx
+++ b/sprint_retrospective.pptx
@@ -4186,7 +4186,9 @@
           <a:lstStyle/>
           <a:p>
             <a:r>
-              <a:rPr lang="en-GB" dirty="0"/>
+              <a:rPr lang="en-GB" dirty="0">
+                <a:latin typeface="Raleway Medium" panose="020B0603030101060003" pitchFamily="34" charset="0"/>
+              </a:rPr>
               <a:t>Sprint retrospective</a:t>
             </a:r>
           </a:p>
@@ -4217,7 +4219,9 @@
           <a:p>
             <a:pPr algn="ctr"/>
             <a:r>
-              <a:rPr lang="it-IT" sz="3600" dirty="0"/>
+              <a:rPr lang="it-IT" sz="3600" dirty="0">
+                <a:latin typeface="Raleway Medium" panose="020B0603030101060003" pitchFamily="34" charset="0"/>
+              </a:rPr>
               <a:t>Team A</a:t>
             </a:r>
           </a:p>
@@ -4275,7 +4279,9 @@
           <a:lstStyle/>
           <a:p>
             <a:r>
-              <a:rPr lang="it-IT" dirty="0"/>
+              <a:rPr lang="it-IT" dirty="0">
+                <a:latin typeface="Raleway Medium" panose="020B0603030101060003" pitchFamily="34" charset="0"/>
+              </a:rPr>
               <a:t>Stories</a:t>
             </a:r>
           </a:p>
@@ -4304,17 +4310,23 @@
           </a:bodyPr>
           <a:lstStyle/>
           <a:p>
-            <a:endParaRPr lang="en-GB" sz="2800" dirty="0"/>
-          </a:p>
-          <a:p>
-            <a:r>
-              <a:rPr lang="en-GB" sz="2800" dirty="0"/>
+            <a:endParaRPr lang="en-GB" sz="900" dirty="0">
+              <a:latin typeface="Raleway Medium" panose="020B0603030101060003" pitchFamily="34" charset="0"/>
+            </a:endParaRPr>
+          </a:p>
+          <a:p>
+            <a:r>
+              <a:rPr lang="en-GB" sz="2600" dirty="0">
+                <a:latin typeface="Raleway Medium" panose="020B0603030101060003" pitchFamily="34" charset="0"/>
+              </a:rPr>
               <a:t>We decided to commit for 5 out of 7 stories, since the latest two had so many points assigned that they would have doubled the work.</a:t>
             </a:r>
           </a:p>
           <a:p>
             <a:r>
-              <a:rPr lang="en-GB" sz="2800" dirty="0"/>
+              <a:rPr lang="en-GB" sz="2600" dirty="0">
+                <a:latin typeface="Raleway Medium" panose="020B0603030101060003" pitchFamily="34" charset="0"/>
+              </a:rPr>
               <a:t>The stories we committed for have a total score of 13 points.</a:t>
             </a:r>
           </a:p>
@@ -4394,52 +4406,72 @@
             <p:ph idx="1"/>
           </p:nvPr>
         </p:nvSpPr>
-        <p:spPr/>
+        <p:spPr>
+          <a:xfrm>
+            <a:off x="1097280" y="1845734"/>
+            <a:ext cx="10058400" cy="4386390"/>
+          </a:xfrm>
+        </p:spPr>
         <p:txBody>
           <a:bodyPr>
-            <a:normAutofit lnSpcReduction="10000"/>
+            <a:normAutofit/>
           </a:bodyPr>
           <a:lstStyle/>
           <a:p>
-            <a:endParaRPr lang="it-IT" sz="2800" dirty="0"/>
-          </a:p>
-          <a:p>
-            <a:r>
-              <a:rPr lang="en-GB" sz="2800" dirty="0"/>
+            <a:endParaRPr lang="en-GB" sz="900" dirty="0">
+              <a:latin typeface="Raleway Medium" panose="020B0603030101060003" pitchFamily="34" charset="0"/>
+            </a:endParaRPr>
+          </a:p>
+          <a:p>
+            <a:r>
+              <a:rPr lang="en-GB" sz="2600" dirty="0">
+                <a:latin typeface="Raleway Medium" panose="020B0603030101060003" pitchFamily="34" charset="0"/>
+              </a:rPr>
               <a:t>Each story was divided in 4 or 5 tasks, each one with different length.</a:t>
             </a:r>
           </a:p>
           <a:p>
             <a:r>
-              <a:rPr lang="en-GB" sz="2800" dirty="0"/>
+              <a:rPr lang="en-GB" sz="2600" dirty="0">
+                <a:latin typeface="Raleway Medium" panose="020B0603030101060003" pitchFamily="34" charset="0"/>
+              </a:rPr>
               <a:t>Each task has an average estimated duration of 40/50 minutes. The overall.</a:t>
             </a:r>
           </a:p>
           <a:p>
             <a:r>
-              <a:rPr lang="en-GB" sz="2800" dirty="0"/>
+              <a:rPr lang="en-GB" sz="2600" dirty="0">
+                <a:latin typeface="Raleway Medium" panose="020B0603030101060003" pitchFamily="34" charset="0"/>
+              </a:rPr>
               <a:t>The setup was estimated having 5 points, lasting about 15 hours in total. This increased the average estimation to 1 hour per task.</a:t>
             </a:r>
           </a:p>
           <a:p>
             <a:r>
-              <a:rPr lang="en-GB" sz="2800" dirty="0"/>
+              <a:rPr lang="en-GB" sz="2600" dirty="0">
+                <a:latin typeface="Raleway Medium" panose="020B0603030101060003" pitchFamily="34" charset="0"/>
+              </a:rPr>
               <a:t>The actual average time spent on each task was roughly 1:30 hours.</a:t>
             </a:r>
           </a:p>
           <a:p>
             <a:r>
-              <a:rPr lang="en-GB" sz="2800" dirty="0"/>
+              <a:rPr lang="en-GB" sz="2600" dirty="0">
+                <a:latin typeface="Raleway Medium" panose="020B0603030101060003" pitchFamily="34" charset="0"/>
+              </a:rPr>
               <a:t>More details in our estimation can be found </a:t>
             </a:r>
             <a:r>
-              <a:rPr lang="en-GB" sz="2800" dirty="0">
+              <a:rPr lang="en-GB" sz="2600" dirty="0">
+                <a:latin typeface="Raleway Medium" panose="020B0603030101060003" pitchFamily="34" charset="0"/>
                 <a:hlinkClick r:id="rId2"/>
               </a:rPr>
               <a:t>here</a:t>
             </a:r>
             <a:r>
-              <a:rPr lang="it-IT" sz="2800" dirty="0"/>
+              <a:rPr lang="it-IT" sz="2600" dirty="0">
+                <a:latin typeface="Raleway Medium" panose="020B0603030101060003" pitchFamily="34" charset="0"/>
+              </a:rPr>
               <a:t>.</a:t>
             </a:r>
           </a:p>
@@ -4526,7 +4558,7 @@
           </a:bodyPr>
           <a:lstStyle/>
           <a:p>
-            <a:endParaRPr lang="it-IT" sz="2800" dirty="0"/>
+            <a:endParaRPr lang="it-IT" sz="900" dirty="0"/>
           </a:p>
           <a:p>
             <a:r>
@@ -4600,7 +4632,9 @@
           <a:lstStyle/>
           <a:p>
             <a:r>
-              <a:rPr lang="en-GB" dirty="0"/>
+              <a:rPr lang="en-GB" dirty="0">
+                <a:latin typeface="Raleway Medium" panose="020B0603030101060003" pitchFamily="34" charset="0"/>
+              </a:rPr>
               <a:t>Stories and estimations: points</a:t>
             </a:r>
           </a:p>
@@ -4629,29 +4663,39 @@
           </a:bodyPr>
           <a:lstStyle/>
           <a:p>
-            <a:endParaRPr lang="it-IT" sz="2800" dirty="0"/>
-          </a:p>
-          <a:p>
-            <a:r>
-              <a:rPr lang="en-GB" sz="2800" dirty="0"/>
+            <a:endParaRPr lang="en-GB" sz="900" dirty="0">
+              <a:latin typeface="Raleway Medium" panose="020B0603030101060003" pitchFamily="34" charset="0"/>
+            </a:endParaRPr>
+          </a:p>
+          <a:p>
+            <a:r>
+              <a:rPr lang="en-GB" sz="2600" dirty="0">
+                <a:latin typeface="Raleway Medium" panose="020B0603030101060003" pitchFamily="34" charset="0"/>
+              </a:rPr>
               <a:t>We only had 3 and 2 points stories.</a:t>
             </a:r>
           </a:p>
           <a:p>
             <a:r>
-              <a:rPr lang="en-GB" sz="2800" dirty="0"/>
+              <a:rPr lang="en-GB" sz="2600" dirty="0">
+                <a:latin typeface="Raleway Medium" panose="020B0603030101060003" pitchFamily="34" charset="0"/>
+              </a:rPr>
               <a:t>For the 3 point ones, the total average time spent on each was 4:30 hours.</a:t>
             </a:r>
           </a:p>
           <a:p>
             <a:r>
-              <a:rPr lang="en-GB" sz="2800" dirty="0"/>
+              <a:rPr lang="en-GB" sz="2600" dirty="0">
+                <a:latin typeface="Raleway Medium" panose="020B0603030101060003" pitchFamily="34" charset="0"/>
+              </a:rPr>
               <a:t>For the 2 point ones, it was also 4:30 hours.</a:t>
             </a:r>
           </a:p>
           <a:p>
             <a:r>
-              <a:rPr lang="en-GB" sz="2800" dirty="0"/>
+              <a:rPr lang="en-GB" sz="2600" dirty="0">
+                <a:latin typeface="Raleway Medium" panose="020B0603030101060003" pitchFamily="34" charset="0"/>
+              </a:rPr>
               <a:t>This is probably due to an estimation error in one of the 2-point stories, since it lasted the same time as the longest of the 3-points ones.</a:t>
             </a:r>
           </a:p>
@@ -4709,7 +4753,9 @@
           <a:lstStyle/>
           <a:p>
             <a:r>
-              <a:rPr lang="en-GB" dirty="0"/>
+              <a:rPr lang="en-GB" dirty="0">
+                <a:latin typeface="Raleway Medium" panose="020B0603030101060003" pitchFamily="34" charset="0"/>
+              </a:rPr>
               <a:t>Stories and estimations: time</a:t>
             </a:r>
           </a:p>
@@ -4738,17 +4784,23 @@
           </a:bodyPr>
           <a:lstStyle/>
           <a:p>
-            <a:endParaRPr lang="it-IT" sz="2800" dirty="0"/>
-          </a:p>
-          <a:p>
-            <a:r>
-              <a:rPr lang="en-GB" sz="2800" dirty="0"/>
+            <a:endParaRPr lang="it-IT" sz="900" dirty="0">
+              <a:latin typeface="Raleway Medium" panose="020B0603030101060003" pitchFamily="34" charset="0"/>
+            </a:endParaRPr>
+          </a:p>
+          <a:p>
+            <a:r>
+              <a:rPr lang="en-GB" sz="2600" dirty="0">
+                <a:latin typeface="Raleway Medium" panose="020B0603030101060003" pitchFamily="34" charset="0"/>
+              </a:rPr>
               <a:t>Since the error in calculating the points, we have a paradox: the longest stories in time (5 hours) have an average of 2.5 points, while shorter ones have an average of 3 points.</a:t>
             </a:r>
           </a:p>
           <a:p>
             <a:r>
-              <a:rPr lang="en-GB" sz="2800" dirty="0"/>
+              <a:rPr lang="en-GB" sz="2600" dirty="0">
+                <a:latin typeface="Raleway Medium" panose="020B0603030101060003" pitchFamily="34" charset="0"/>
+              </a:rPr>
               <a:t>The only story lasting 4:30 hours has an average of 3 points, while the ones lasting 4 hours have an average of 2.5 points.</a:t>
             </a:r>
           </a:p>
@@ -4806,7 +4858,9 @@
           <a:lstStyle/>
           <a:p>
             <a:r>
-              <a:rPr lang="en-GB" dirty="0"/>
+              <a:rPr lang="en-GB" dirty="0">
+                <a:latin typeface="Raleway Medium" panose="020B0603030101060003" pitchFamily="34" charset="0"/>
+              </a:rPr>
               <a:t>What we learned</a:t>
             </a:r>
           </a:p>
@@ -4835,7 +4889,9 @@
           </a:bodyPr>
           <a:lstStyle/>
           <a:p>
-            <a:endParaRPr lang="it-IT" sz="2800" dirty="0"/>
+            <a:endParaRPr lang="it-IT" sz="900" dirty="0">
+              <a:latin typeface="Raleway Medium" panose="020B0603030101060003" pitchFamily="34" charset="0"/>
+            </a:endParaRPr>
           </a:p>
           <a:p>
             <a:pPr>
@@ -4843,7 +4899,9 @@
               <a:buChar char="•"/>
             </a:pPr>
             <a:r>
-              <a:rPr lang="en-GB" sz="2800" dirty="0"/>
+              <a:rPr lang="en-GB" sz="2600" dirty="0">
+                <a:latin typeface="Raleway Medium" panose="020B0603030101060003" pitchFamily="34" charset="0"/>
+              </a:rPr>
               <a:t>Estimation is not easy, even with poker</a:t>
             </a:r>
           </a:p>
@@ -4853,7 +4911,9 @@
               <a:buChar char="•"/>
             </a:pPr>
             <a:r>
-              <a:rPr lang="en-GB" sz="2800" dirty="0"/>
+              <a:rPr lang="en-GB" sz="2600" dirty="0">
+                <a:latin typeface="Raleway Medium" panose="020B0603030101060003" pitchFamily="34" charset="0"/>
+              </a:rPr>
               <a:t>The team may have different visions from you, and many coding styles differ from each other because of this; also, because of this, the code should have meaningful variable names and comments.</a:t>
             </a:r>
           </a:p>
@@ -4863,7 +4923,9 @@
               <a:buChar char="•"/>
             </a:pPr>
             <a:r>
-              <a:rPr lang="en-GB" sz="2800" dirty="0"/>
+              <a:rPr lang="en-GB" sz="2600" dirty="0">
+                <a:latin typeface="Raleway Medium" panose="020B0603030101060003" pitchFamily="34" charset="0"/>
+              </a:rPr>
               <a:t>We should have divided our tasks better.</a:t>
             </a:r>
           </a:p>
@@ -4921,7 +4983,9 @@
           <a:lstStyle/>
           <a:p>
             <a:r>
-              <a:rPr lang="en-GB" dirty="0"/>
+              <a:rPr lang="en-GB" dirty="0">
+                <a:latin typeface="Raleway Medium" panose="020B0603030101060003" pitchFamily="34" charset="0"/>
+              </a:rPr>
               <a:t>What we are proud of</a:t>
             </a:r>
           </a:p>
@@ -4950,7 +5014,9 @@
           </a:bodyPr>
           <a:lstStyle/>
           <a:p>
-            <a:endParaRPr lang="it-IT" sz="2800" dirty="0"/>
+            <a:endParaRPr lang="it-IT" sz="900" dirty="0">
+              <a:latin typeface="Raleway Medium" panose="020B0603030101060003" pitchFamily="34" charset="0"/>
+            </a:endParaRPr>
           </a:p>
           <a:p>
             <a:pPr>
@@ -4958,7 +5024,9 @@
               <a:buChar char="•"/>
             </a:pPr>
             <a:r>
-              <a:rPr lang="en-GB" sz="2800" dirty="0"/>
+              <a:rPr lang="en-GB" sz="2600" dirty="0">
+                <a:latin typeface="Raleway Medium" panose="020B0603030101060003" pitchFamily="34" charset="0"/>
+              </a:rPr>
               <a:t>Buttons. They are big, Gertrude is happy.</a:t>
             </a:r>
           </a:p>
@@ -4968,7 +5036,9 @@
               <a:buChar char="•"/>
             </a:pPr>
             <a:r>
-              <a:rPr lang="en-GB" sz="2800" dirty="0"/>
+              <a:rPr lang="en-GB" sz="2600" dirty="0">
+                <a:latin typeface="Raleway Medium" panose="020B0603030101060003" pitchFamily="34" charset="0"/>
+              </a:rPr>
               <a:t>Modularity: the code is really flexible and allows us even to use it in a rough way, sacrificing little performance to improve developing time</a:t>
             </a:r>
           </a:p>
@@ -4978,9 +5048,20 @@
               <a:buChar char="•"/>
             </a:pPr>
             <a:r>
-              <a:rPr lang="en-GB" sz="2800" dirty="0"/>
-              <a:t>An off-by-1 bug that no one noticed. Thank you!</a:t>
-            </a:r>
+              <a:rPr lang="en-GB" sz="2600" dirty="0">
+                <a:latin typeface="Raleway Medium" panose="020B0603030101060003" pitchFamily="34" charset="0"/>
+              </a:rPr>
+              <a:t>An off-by-1 bug that no one </a:t>
+            </a:r>
+            <a:r>
+              <a:rPr lang="en-GB" sz="2600">
+                <a:latin typeface="Raleway Medium" panose="020B0603030101060003" pitchFamily="34" charset="0"/>
+              </a:rPr>
+              <a:t>noticed.</a:t>
+            </a:r>
+            <a:endParaRPr lang="en-GB" sz="2600" dirty="0">
+              <a:latin typeface="Raleway Medium" panose="020B0603030101060003" pitchFamily="34" charset="0"/>
+            </a:endParaRPr>
           </a:p>
         </p:txBody>
       </p:sp>
@@ -5036,7 +5117,9 @@
           <a:lstStyle/>
           <a:p>
             <a:r>
-              <a:rPr lang="en-GB"/>
+              <a:rPr lang="en-GB" dirty="0">
+                <a:latin typeface="Raleway Medium" panose="020B0603030101060003" pitchFamily="34" charset="0"/>
+              </a:rPr>
               <a:t>Thank you!</a:t>
             </a:r>
           </a:p>

</xml_diff>

<commit_message>
Animations and transitions added
</commit_message>
<xml_diff>
--- a/sprint_retrospective.pptx
+++ b/sprint_retrospective.pptx
@@ -789,6 +789,18 @@
   <p:clrMapOvr>
     <a:masterClrMapping/>
   </p:clrMapOvr>
+  <mc:AlternateContent xmlns:mc="http://schemas.openxmlformats.org/markup-compatibility/2006">
+    <mc:Choice xmlns:p159="http://schemas.microsoft.com/office/powerpoint/2015/09/main" Requires="p159">
+      <p:transition xmlns:p14="http://schemas.microsoft.com/office/powerpoint/2010/main" spd="slow" p14:dur="2000">
+        <p159:morph option="byObject"/>
+      </p:transition>
+    </mc:Choice>
+    <mc:Fallback>
+      <p:transition spd="slow">
+        <p:fade/>
+      </p:transition>
+    </mc:Fallback>
+  </mc:AlternateContent>
 </p:sldLayout>
 </file>
 
@@ -959,6 +971,18 @@
   <p:clrMapOvr>
     <a:masterClrMapping/>
   </p:clrMapOvr>
+  <mc:AlternateContent xmlns:mc="http://schemas.openxmlformats.org/markup-compatibility/2006">
+    <mc:Choice xmlns:p159="http://schemas.microsoft.com/office/powerpoint/2015/09/main" Requires="p159">
+      <p:transition xmlns:p14="http://schemas.microsoft.com/office/powerpoint/2010/main" spd="slow" p14:dur="2000">
+        <p159:morph option="byObject"/>
+      </p:transition>
+    </mc:Choice>
+    <mc:Fallback>
+      <p:transition spd="slow">
+        <p:fade/>
+      </p:transition>
+    </mc:Fallback>
+  </mc:AlternateContent>
 </p:sldLayout>
 </file>
 
@@ -1215,6 +1239,18 @@
   <p:clrMapOvr>
     <a:masterClrMapping/>
   </p:clrMapOvr>
+  <mc:AlternateContent xmlns:mc="http://schemas.openxmlformats.org/markup-compatibility/2006">
+    <mc:Choice xmlns:p159="http://schemas.microsoft.com/office/powerpoint/2015/09/main" Requires="p159">
+      <p:transition xmlns:p14="http://schemas.microsoft.com/office/powerpoint/2010/main" spd="slow" p14:dur="2000">
+        <p159:morph option="byObject"/>
+      </p:transition>
+    </mc:Choice>
+    <mc:Fallback>
+      <p:transition spd="slow">
+        <p:fade/>
+      </p:transition>
+    </mc:Fallback>
+  </mc:AlternateContent>
 </p:sldLayout>
 </file>
 
@@ -1389,6 +1425,18 @@
   <p:clrMapOvr>
     <a:masterClrMapping/>
   </p:clrMapOvr>
+  <mc:AlternateContent xmlns:mc="http://schemas.openxmlformats.org/markup-compatibility/2006">
+    <mc:Choice xmlns:p159="http://schemas.microsoft.com/office/powerpoint/2015/09/main" Requires="p159">
+      <p:transition xmlns:p14="http://schemas.microsoft.com/office/powerpoint/2010/main" spd="slow" p14:dur="2000">
+        <p159:morph option="byObject"/>
+      </p:transition>
+    </mc:Choice>
+    <mc:Fallback>
+      <p:transition spd="slow">
+        <p:fade/>
+      </p:transition>
+    </mc:Fallback>
+  </mc:AlternateContent>
 </p:sldLayout>
 </file>
 
@@ -1762,6 +1810,18 @@
   <p:clrMapOvr>
     <a:masterClrMapping/>
   </p:clrMapOvr>
+  <mc:AlternateContent xmlns:mc="http://schemas.openxmlformats.org/markup-compatibility/2006">
+    <mc:Choice xmlns:p159="http://schemas.microsoft.com/office/powerpoint/2015/09/main" Requires="p159">
+      <p:transition xmlns:p14="http://schemas.microsoft.com/office/powerpoint/2010/main" spd="slow" p14:dur="2000">
+        <p159:morph option="byObject"/>
+      </p:transition>
+    </mc:Choice>
+    <mc:Fallback>
+      <p:transition spd="slow">
+        <p:fade/>
+      </p:transition>
+    </mc:Fallback>
+  </mc:AlternateContent>
 </p:sldLayout>
 </file>
 
@@ -1999,6 +2059,18 @@
   <p:clrMapOvr>
     <a:masterClrMapping/>
   </p:clrMapOvr>
+  <mc:AlternateContent xmlns:mc="http://schemas.openxmlformats.org/markup-compatibility/2006">
+    <mc:Choice xmlns:p159="http://schemas.microsoft.com/office/powerpoint/2015/09/main" Requires="p159">
+      <p:transition xmlns:p14="http://schemas.microsoft.com/office/powerpoint/2010/main" spd="slow" p14:dur="2000">
+        <p159:morph option="byObject"/>
+      </p:transition>
+    </mc:Choice>
+    <mc:Fallback>
+      <p:transition spd="slow">
+        <p:fade/>
+      </p:transition>
+    </mc:Fallback>
+  </mc:AlternateContent>
 </p:sldLayout>
 </file>
 
@@ -2378,6 +2450,18 @@
   <p:clrMapOvr>
     <a:masterClrMapping/>
   </p:clrMapOvr>
+  <mc:AlternateContent xmlns:mc="http://schemas.openxmlformats.org/markup-compatibility/2006">
+    <mc:Choice xmlns:p159="http://schemas.microsoft.com/office/powerpoint/2015/09/main" Requires="p159">
+      <p:transition xmlns:p14="http://schemas.microsoft.com/office/powerpoint/2010/main" spd="slow" p14:dur="2000">
+        <p159:morph option="byObject"/>
+      </p:transition>
+    </mc:Choice>
+    <mc:Fallback>
+      <p:transition spd="slow">
+        <p:fade/>
+      </p:transition>
+    </mc:Fallback>
+  </mc:AlternateContent>
 </p:sldLayout>
 </file>
 
@@ -2496,6 +2580,18 @@
   <p:clrMapOvr>
     <a:masterClrMapping/>
   </p:clrMapOvr>
+  <mc:AlternateContent xmlns:mc="http://schemas.openxmlformats.org/markup-compatibility/2006">
+    <mc:Choice xmlns:p159="http://schemas.microsoft.com/office/powerpoint/2015/09/main" Requires="p159">
+      <p:transition xmlns:p14="http://schemas.microsoft.com/office/powerpoint/2010/main" spd="slow" p14:dur="2000">
+        <p159:morph option="byObject"/>
+      </p:transition>
+    </mc:Choice>
+    <mc:Fallback>
+      <p:transition spd="slow">
+        <p:fade/>
+      </p:transition>
+    </mc:Fallback>
+  </mc:AlternateContent>
 </p:sldLayout>
 </file>
 
@@ -2675,6 +2771,18 @@
   <p:clrMapOvr>
     <a:masterClrMapping/>
   </p:clrMapOvr>
+  <mc:AlternateContent xmlns:mc="http://schemas.openxmlformats.org/markup-compatibility/2006">
+    <mc:Choice xmlns:p159="http://schemas.microsoft.com/office/powerpoint/2015/09/main" Requires="p159">
+      <p:transition xmlns:p14="http://schemas.microsoft.com/office/powerpoint/2010/main" spd="slow" p14:dur="2000">
+        <p159:morph option="byObject"/>
+      </p:transition>
+    </mc:Choice>
+    <mc:Fallback>
+      <p:transition spd="slow">
+        <p:fade/>
+      </p:transition>
+    </mc:Fallback>
+  </mc:AlternateContent>
 </p:sldLayout>
 </file>
 
@@ -3042,6 +3150,18 @@
   <p:clrMapOvr>
     <a:masterClrMapping/>
   </p:clrMapOvr>
+  <mc:AlternateContent xmlns:mc="http://schemas.openxmlformats.org/markup-compatibility/2006">
+    <mc:Choice xmlns:p159="http://schemas.microsoft.com/office/powerpoint/2015/09/main" Requires="p159">
+      <p:transition xmlns:p14="http://schemas.microsoft.com/office/powerpoint/2010/main" spd="slow" p14:dur="2000">
+        <p159:morph option="byObject"/>
+      </p:transition>
+    </mc:Choice>
+    <mc:Fallback>
+      <p:transition spd="slow">
+        <p:fade/>
+      </p:transition>
+    </mc:Fallback>
+  </mc:AlternateContent>
 </p:sldLayout>
 </file>
 
@@ -3403,6 +3523,18 @@
   <p:clrMapOvr>
     <a:masterClrMapping/>
   </p:clrMapOvr>
+  <mc:AlternateContent xmlns:mc="http://schemas.openxmlformats.org/markup-compatibility/2006">
+    <mc:Choice xmlns:p159="http://schemas.microsoft.com/office/powerpoint/2015/09/main" Requires="p159">
+      <p:transition xmlns:p14="http://schemas.microsoft.com/office/powerpoint/2010/main" spd="slow" p14:dur="2000">
+        <p159:morph option="byObject"/>
+      </p:transition>
+    </mc:Choice>
+    <mc:Fallback>
+      <p:transition spd="slow">
+        <p:fade/>
+      </p:transition>
+    </mc:Fallback>
+  </mc:AlternateContent>
 </p:sldLayout>
 </file>
 
@@ -3790,6 +3922,18 @@
     <p:sldLayoutId id="2147483906" r:id="rId10"/>
     <p:sldLayoutId id="2147483907" r:id="rId11"/>
   </p:sldLayoutIdLst>
+  <mc:AlternateContent xmlns:mc="http://schemas.openxmlformats.org/markup-compatibility/2006">
+    <mc:Choice xmlns:p159="http://schemas.microsoft.com/office/powerpoint/2015/09/main" Requires="p159">
+      <p:transition xmlns:p14="http://schemas.microsoft.com/office/powerpoint/2010/main" spd="slow" p14:dur="2000">
+        <p159:morph option="byObject"/>
+      </p:transition>
+    </mc:Choice>
+    <mc:Fallback>
+      <p:transition spd="slow">
+        <p:fade/>
+      </p:transition>
+    </mc:Fallback>
+  </mc:AlternateContent>
   <p:txStyles>
     <p:titleStyle>
       <a:lvl1pPr algn="l" defTabSz="914400" rtl="0" eaLnBrk="1" latinLnBrk="0" hangingPunct="1">
@@ -4432,6 +4576,18 @@
   <p:clrMapOvr>
     <a:masterClrMapping/>
   </p:clrMapOvr>
+  <mc:AlternateContent xmlns:mc="http://schemas.openxmlformats.org/markup-compatibility/2006">
+    <mc:Choice xmlns:p159="http://schemas.microsoft.com/office/powerpoint/2015/09/main" Requires="p159">
+      <p:transition xmlns:p14="http://schemas.microsoft.com/office/powerpoint/2010/main" spd="slow" p14:dur="2000">
+        <p159:morph option="byObject"/>
+      </p:transition>
+    </mc:Choice>
+    <mc:Fallback>
+      <p:transition spd="slow">
+        <p:fade/>
+      </p:transition>
+    </mc:Fallback>
+  </mc:AlternateContent>
 </p:sld>
 </file>
 
@@ -4537,6 +4693,170 @@
   <p:clrMapOvr>
     <a:masterClrMapping/>
   </p:clrMapOvr>
+  <mc:AlternateContent xmlns:mc="http://schemas.openxmlformats.org/markup-compatibility/2006">
+    <mc:Choice xmlns:p159="http://schemas.microsoft.com/office/powerpoint/2015/09/main" Requires="p159">
+      <p:transition xmlns:p14="http://schemas.microsoft.com/office/powerpoint/2010/main" spd="slow" p14:dur="2000">
+        <p159:morph option="byObject"/>
+      </p:transition>
+    </mc:Choice>
+    <mc:Fallback>
+      <p:transition spd="slow">
+        <p:fade/>
+      </p:transition>
+    </mc:Fallback>
+  </mc:AlternateContent>
+  <p:timing>
+    <p:tnLst>
+      <p:par>
+        <p:cTn id="1" dur="indefinite" restart="never" nodeType="tmRoot">
+          <p:childTnLst>
+            <p:seq concurrent="1" nextAc="seek">
+              <p:cTn id="2" dur="indefinite" nodeType="mainSeq">
+                <p:childTnLst>
+                  <p:par>
+                    <p:cTn id="3" fill="hold">
+                      <p:stCondLst>
+                        <p:cond delay="indefinite"/>
+                      </p:stCondLst>
+                      <p:childTnLst>
+                        <p:par>
+                          <p:cTn id="4" fill="hold">
+                            <p:stCondLst>
+                              <p:cond delay="0"/>
+                            </p:stCondLst>
+                            <p:childTnLst>
+                              <p:par>
+                                <p:cTn id="5" presetID="10" presetClass="entr" presetSubtype="0" fill="hold" nodeType="clickEffect">
+                                  <p:stCondLst>
+                                    <p:cond delay="0"/>
+                                  </p:stCondLst>
+                                  <p:childTnLst>
+                                    <p:set>
+                                      <p:cBhvr>
+                                        <p:cTn id="6" dur="1" fill="hold">
+                                          <p:stCondLst>
+                                            <p:cond delay="0"/>
+                                          </p:stCondLst>
+                                        </p:cTn>
+                                        <p:tgtEl>
+                                          <p:spTgt spid="3">
+                                            <p:txEl>
+                                              <p:pRg st="1" end="1"/>
+                                            </p:txEl>
+                                          </p:spTgt>
+                                        </p:tgtEl>
+                                        <p:attrNameLst>
+                                          <p:attrName>style.visibility</p:attrName>
+                                        </p:attrNameLst>
+                                      </p:cBhvr>
+                                      <p:to>
+                                        <p:strVal val="visible"/>
+                                      </p:to>
+                                    </p:set>
+                                    <p:animEffect transition="in" filter="fade">
+                                      <p:cBhvr>
+                                        <p:cTn id="7" dur="500"/>
+                                        <p:tgtEl>
+                                          <p:spTgt spid="3">
+                                            <p:txEl>
+                                              <p:pRg st="1" end="1"/>
+                                            </p:txEl>
+                                          </p:spTgt>
+                                        </p:tgtEl>
+                                      </p:cBhvr>
+                                    </p:animEffect>
+                                  </p:childTnLst>
+                                </p:cTn>
+                              </p:par>
+                            </p:childTnLst>
+                          </p:cTn>
+                        </p:par>
+                      </p:childTnLst>
+                    </p:cTn>
+                  </p:par>
+                  <p:par>
+                    <p:cTn id="8" fill="hold">
+                      <p:stCondLst>
+                        <p:cond delay="indefinite"/>
+                      </p:stCondLst>
+                      <p:childTnLst>
+                        <p:par>
+                          <p:cTn id="9" fill="hold">
+                            <p:stCondLst>
+                              <p:cond delay="0"/>
+                            </p:stCondLst>
+                            <p:childTnLst>
+                              <p:par>
+                                <p:cTn id="10" presetID="10" presetClass="entr" presetSubtype="0" fill="hold" nodeType="clickEffect">
+                                  <p:stCondLst>
+                                    <p:cond delay="0"/>
+                                  </p:stCondLst>
+                                  <p:childTnLst>
+                                    <p:set>
+                                      <p:cBhvr>
+                                        <p:cTn id="11" dur="1" fill="hold">
+                                          <p:stCondLst>
+                                            <p:cond delay="0"/>
+                                          </p:stCondLst>
+                                        </p:cTn>
+                                        <p:tgtEl>
+                                          <p:spTgt spid="3">
+                                            <p:txEl>
+                                              <p:pRg st="2" end="2"/>
+                                            </p:txEl>
+                                          </p:spTgt>
+                                        </p:tgtEl>
+                                        <p:attrNameLst>
+                                          <p:attrName>style.visibility</p:attrName>
+                                        </p:attrNameLst>
+                                      </p:cBhvr>
+                                      <p:to>
+                                        <p:strVal val="visible"/>
+                                      </p:to>
+                                    </p:set>
+                                    <p:animEffect transition="in" filter="fade">
+                                      <p:cBhvr>
+                                        <p:cTn id="12" dur="500"/>
+                                        <p:tgtEl>
+                                          <p:spTgt spid="3">
+                                            <p:txEl>
+                                              <p:pRg st="2" end="2"/>
+                                            </p:txEl>
+                                          </p:spTgt>
+                                        </p:tgtEl>
+                                      </p:cBhvr>
+                                    </p:animEffect>
+                                  </p:childTnLst>
+                                </p:cTn>
+                              </p:par>
+                            </p:childTnLst>
+                          </p:cTn>
+                        </p:par>
+                      </p:childTnLst>
+                    </p:cTn>
+                  </p:par>
+                </p:childTnLst>
+              </p:cTn>
+              <p:prevCondLst>
+                <p:cond evt="onPrev" delay="0">
+                  <p:tgtEl>
+                    <p:sldTgt/>
+                  </p:tgtEl>
+                </p:cond>
+              </p:prevCondLst>
+              <p:nextCondLst>
+                <p:cond evt="onNext" delay="0">
+                  <p:tgtEl>
+                    <p:sldTgt/>
+                  </p:tgtEl>
+                </p:cond>
+              </p:nextCondLst>
+            </p:seq>
+          </p:childTnLst>
+        </p:cTn>
+      </p:par>
+    </p:tnLst>
+  </p:timing>
 </p:sld>
 </file>
 
@@ -4682,6 +5002,299 @@
   <p:clrMapOvr>
     <a:masterClrMapping/>
   </p:clrMapOvr>
+  <mc:AlternateContent xmlns:mc="http://schemas.openxmlformats.org/markup-compatibility/2006">
+    <mc:Choice xmlns:p159="http://schemas.microsoft.com/office/powerpoint/2015/09/main" Requires="p159">
+      <p:transition xmlns:p14="http://schemas.microsoft.com/office/powerpoint/2010/main" spd="slow" p14:dur="2000">
+        <p159:morph option="byObject"/>
+      </p:transition>
+    </mc:Choice>
+    <mc:Fallback>
+      <p:transition spd="slow">
+        <p:fade/>
+      </p:transition>
+    </mc:Fallback>
+  </mc:AlternateContent>
+  <p:timing>
+    <p:tnLst>
+      <p:par>
+        <p:cTn id="1" dur="indefinite" restart="never" nodeType="tmRoot">
+          <p:childTnLst>
+            <p:seq concurrent="1" nextAc="seek">
+              <p:cTn id="2" dur="indefinite" nodeType="mainSeq">
+                <p:childTnLst>
+                  <p:par>
+                    <p:cTn id="3" fill="hold">
+                      <p:stCondLst>
+                        <p:cond delay="indefinite"/>
+                      </p:stCondLst>
+                      <p:childTnLst>
+                        <p:par>
+                          <p:cTn id="4" fill="hold">
+                            <p:stCondLst>
+                              <p:cond delay="0"/>
+                            </p:stCondLst>
+                            <p:childTnLst>
+                              <p:par>
+                                <p:cTn id="5" presetID="10" presetClass="entr" presetSubtype="0" fill="hold" nodeType="clickEffect">
+                                  <p:stCondLst>
+                                    <p:cond delay="0"/>
+                                  </p:stCondLst>
+                                  <p:childTnLst>
+                                    <p:set>
+                                      <p:cBhvr>
+                                        <p:cTn id="6" dur="1" fill="hold">
+                                          <p:stCondLst>
+                                            <p:cond delay="0"/>
+                                          </p:stCondLst>
+                                        </p:cTn>
+                                        <p:tgtEl>
+                                          <p:spTgt spid="3">
+                                            <p:txEl>
+                                              <p:pRg st="1" end="1"/>
+                                            </p:txEl>
+                                          </p:spTgt>
+                                        </p:tgtEl>
+                                        <p:attrNameLst>
+                                          <p:attrName>style.visibility</p:attrName>
+                                        </p:attrNameLst>
+                                      </p:cBhvr>
+                                      <p:to>
+                                        <p:strVal val="visible"/>
+                                      </p:to>
+                                    </p:set>
+                                    <p:animEffect transition="in" filter="fade">
+                                      <p:cBhvr>
+                                        <p:cTn id="7" dur="500"/>
+                                        <p:tgtEl>
+                                          <p:spTgt spid="3">
+                                            <p:txEl>
+                                              <p:pRg st="1" end="1"/>
+                                            </p:txEl>
+                                          </p:spTgt>
+                                        </p:tgtEl>
+                                      </p:cBhvr>
+                                    </p:animEffect>
+                                  </p:childTnLst>
+                                </p:cTn>
+                              </p:par>
+                              <p:par>
+                                <p:cTn id="8" presetID="10" presetClass="entr" presetSubtype="0" fill="hold" nodeType="withEffect">
+                                  <p:stCondLst>
+                                    <p:cond delay="0"/>
+                                  </p:stCondLst>
+                                  <p:childTnLst>
+                                    <p:set>
+                                      <p:cBhvr>
+                                        <p:cTn id="9" dur="1" fill="hold">
+                                          <p:stCondLst>
+                                            <p:cond delay="0"/>
+                                          </p:stCondLst>
+                                        </p:cTn>
+                                        <p:tgtEl>
+                                          <p:spTgt spid="3">
+                                            <p:txEl>
+                                              <p:pRg st="2" end="2"/>
+                                            </p:txEl>
+                                          </p:spTgt>
+                                        </p:tgtEl>
+                                        <p:attrNameLst>
+                                          <p:attrName>style.visibility</p:attrName>
+                                        </p:attrNameLst>
+                                      </p:cBhvr>
+                                      <p:to>
+                                        <p:strVal val="visible"/>
+                                      </p:to>
+                                    </p:set>
+                                    <p:animEffect transition="in" filter="fade">
+                                      <p:cBhvr>
+                                        <p:cTn id="10" dur="500"/>
+                                        <p:tgtEl>
+                                          <p:spTgt spid="3">
+                                            <p:txEl>
+                                              <p:pRg st="2" end="2"/>
+                                            </p:txEl>
+                                          </p:spTgt>
+                                        </p:tgtEl>
+                                      </p:cBhvr>
+                                    </p:animEffect>
+                                  </p:childTnLst>
+                                </p:cTn>
+                              </p:par>
+                            </p:childTnLst>
+                          </p:cTn>
+                        </p:par>
+                      </p:childTnLst>
+                    </p:cTn>
+                  </p:par>
+                  <p:par>
+                    <p:cTn id="11" fill="hold">
+                      <p:stCondLst>
+                        <p:cond delay="indefinite"/>
+                      </p:stCondLst>
+                      <p:childTnLst>
+                        <p:par>
+                          <p:cTn id="12" fill="hold">
+                            <p:stCondLst>
+                              <p:cond delay="0"/>
+                            </p:stCondLst>
+                            <p:childTnLst>
+                              <p:par>
+                                <p:cTn id="13" presetID="10" presetClass="entr" presetSubtype="0" fill="hold" nodeType="clickEffect">
+                                  <p:stCondLst>
+                                    <p:cond delay="0"/>
+                                  </p:stCondLst>
+                                  <p:childTnLst>
+                                    <p:set>
+                                      <p:cBhvr>
+                                        <p:cTn id="14" dur="1" fill="hold">
+                                          <p:stCondLst>
+                                            <p:cond delay="0"/>
+                                          </p:stCondLst>
+                                        </p:cTn>
+                                        <p:tgtEl>
+                                          <p:spTgt spid="3">
+                                            <p:txEl>
+                                              <p:pRg st="3" end="3"/>
+                                            </p:txEl>
+                                          </p:spTgt>
+                                        </p:tgtEl>
+                                        <p:attrNameLst>
+                                          <p:attrName>style.visibility</p:attrName>
+                                        </p:attrNameLst>
+                                      </p:cBhvr>
+                                      <p:to>
+                                        <p:strVal val="visible"/>
+                                      </p:to>
+                                    </p:set>
+                                    <p:animEffect transition="in" filter="fade">
+                                      <p:cBhvr>
+                                        <p:cTn id="15" dur="500"/>
+                                        <p:tgtEl>
+                                          <p:spTgt spid="3">
+                                            <p:txEl>
+                                              <p:pRg st="3" end="3"/>
+                                            </p:txEl>
+                                          </p:spTgt>
+                                        </p:tgtEl>
+                                      </p:cBhvr>
+                                    </p:animEffect>
+                                  </p:childTnLst>
+                                </p:cTn>
+                              </p:par>
+                              <p:par>
+                                <p:cTn id="16" presetID="10" presetClass="entr" presetSubtype="0" fill="hold" nodeType="withEffect">
+                                  <p:stCondLst>
+                                    <p:cond delay="0"/>
+                                  </p:stCondLst>
+                                  <p:childTnLst>
+                                    <p:set>
+                                      <p:cBhvr>
+                                        <p:cTn id="17" dur="1" fill="hold">
+                                          <p:stCondLst>
+                                            <p:cond delay="0"/>
+                                          </p:stCondLst>
+                                        </p:cTn>
+                                        <p:tgtEl>
+                                          <p:spTgt spid="3">
+                                            <p:txEl>
+                                              <p:pRg st="4" end="4"/>
+                                            </p:txEl>
+                                          </p:spTgt>
+                                        </p:tgtEl>
+                                        <p:attrNameLst>
+                                          <p:attrName>style.visibility</p:attrName>
+                                        </p:attrNameLst>
+                                      </p:cBhvr>
+                                      <p:to>
+                                        <p:strVal val="visible"/>
+                                      </p:to>
+                                    </p:set>
+                                    <p:animEffect transition="in" filter="fade">
+                                      <p:cBhvr>
+                                        <p:cTn id="18" dur="500"/>
+                                        <p:tgtEl>
+                                          <p:spTgt spid="3">
+                                            <p:txEl>
+                                              <p:pRg st="4" end="4"/>
+                                            </p:txEl>
+                                          </p:spTgt>
+                                        </p:tgtEl>
+                                      </p:cBhvr>
+                                    </p:animEffect>
+                                  </p:childTnLst>
+                                </p:cTn>
+                              </p:par>
+                              <p:par>
+                                <p:cTn id="19" presetID="10" presetClass="entr" presetSubtype="0" fill="hold" nodeType="withEffect">
+                                  <p:stCondLst>
+                                    <p:cond delay="0"/>
+                                  </p:stCondLst>
+                                  <p:childTnLst>
+                                    <p:set>
+                                      <p:cBhvr>
+                                        <p:cTn id="20" dur="1" fill="hold">
+                                          <p:stCondLst>
+                                            <p:cond delay="0"/>
+                                          </p:stCondLst>
+                                        </p:cTn>
+                                        <p:tgtEl>
+                                          <p:spTgt spid="3">
+                                            <p:txEl>
+                                              <p:pRg st="5" end="5"/>
+                                            </p:txEl>
+                                          </p:spTgt>
+                                        </p:tgtEl>
+                                        <p:attrNameLst>
+                                          <p:attrName>style.visibility</p:attrName>
+                                        </p:attrNameLst>
+                                      </p:cBhvr>
+                                      <p:to>
+                                        <p:strVal val="visible"/>
+                                      </p:to>
+                                    </p:set>
+                                    <p:animEffect transition="in" filter="fade">
+                                      <p:cBhvr>
+                                        <p:cTn id="21" dur="500"/>
+                                        <p:tgtEl>
+                                          <p:spTgt spid="3">
+                                            <p:txEl>
+                                              <p:pRg st="5" end="5"/>
+                                            </p:txEl>
+                                          </p:spTgt>
+                                        </p:tgtEl>
+                                      </p:cBhvr>
+                                    </p:animEffect>
+                                  </p:childTnLst>
+                                </p:cTn>
+                              </p:par>
+                            </p:childTnLst>
+                          </p:cTn>
+                        </p:par>
+                      </p:childTnLst>
+                    </p:cTn>
+                  </p:par>
+                </p:childTnLst>
+              </p:cTn>
+              <p:prevCondLst>
+                <p:cond evt="onPrev" delay="0">
+                  <p:tgtEl>
+                    <p:sldTgt/>
+                  </p:tgtEl>
+                </p:cond>
+              </p:prevCondLst>
+              <p:nextCondLst>
+                <p:cond evt="onNext" delay="0">
+                  <p:tgtEl>
+                    <p:sldTgt/>
+                  </p:tgtEl>
+                </p:cond>
+              </p:nextCondLst>
+            </p:seq>
+          </p:childTnLst>
+        </p:cTn>
+      </p:par>
+    </p:tnLst>
+  </p:timing>
 </p:sld>
 </file>
 
@@ -4785,6 +5398,213 @@
   <p:clrMapOvr>
     <a:masterClrMapping/>
   </p:clrMapOvr>
+  <mc:AlternateContent xmlns:mc="http://schemas.openxmlformats.org/markup-compatibility/2006">
+    <mc:Choice xmlns:p159="http://schemas.microsoft.com/office/powerpoint/2015/09/main" Requires="p159">
+      <p:transition xmlns:p14="http://schemas.microsoft.com/office/powerpoint/2010/main" spd="slow" p14:dur="2000">
+        <p159:morph option="byObject"/>
+      </p:transition>
+    </mc:Choice>
+    <mc:Fallback>
+      <p:transition spd="slow">
+        <p:fade/>
+      </p:transition>
+    </mc:Fallback>
+  </mc:AlternateContent>
+  <p:timing>
+    <p:tnLst>
+      <p:par>
+        <p:cTn id="1" dur="indefinite" restart="never" nodeType="tmRoot">
+          <p:childTnLst>
+            <p:seq concurrent="1" nextAc="seek">
+              <p:cTn id="2" dur="indefinite" nodeType="mainSeq">
+                <p:childTnLst>
+                  <p:par>
+                    <p:cTn id="3" fill="hold">
+                      <p:stCondLst>
+                        <p:cond delay="indefinite"/>
+                      </p:stCondLst>
+                      <p:childTnLst>
+                        <p:par>
+                          <p:cTn id="4" fill="hold">
+                            <p:stCondLst>
+                              <p:cond delay="0"/>
+                            </p:stCondLst>
+                            <p:childTnLst>
+                              <p:par>
+                                <p:cTn id="5" presetID="10" presetClass="entr" presetSubtype="0" fill="hold" nodeType="clickEffect">
+                                  <p:stCondLst>
+                                    <p:cond delay="0"/>
+                                  </p:stCondLst>
+                                  <p:childTnLst>
+                                    <p:set>
+                                      <p:cBhvr>
+                                        <p:cTn id="6" dur="1" fill="hold">
+                                          <p:stCondLst>
+                                            <p:cond delay="0"/>
+                                          </p:stCondLst>
+                                        </p:cTn>
+                                        <p:tgtEl>
+                                          <p:spTgt spid="3">
+                                            <p:txEl>
+                                              <p:pRg st="1" end="1"/>
+                                            </p:txEl>
+                                          </p:spTgt>
+                                        </p:tgtEl>
+                                        <p:attrNameLst>
+                                          <p:attrName>style.visibility</p:attrName>
+                                        </p:attrNameLst>
+                                      </p:cBhvr>
+                                      <p:to>
+                                        <p:strVal val="visible"/>
+                                      </p:to>
+                                    </p:set>
+                                    <p:animEffect transition="in" filter="fade">
+                                      <p:cBhvr>
+                                        <p:cTn id="7" dur="500"/>
+                                        <p:tgtEl>
+                                          <p:spTgt spid="3">
+                                            <p:txEl>
+                                              <p:pRg st="1" end="1"/>
+                                            </p:txEl>
+                                          </p:spTgt>
+                                        </p:tgtEl>
+                                      </p:cBhvr>
+                                    </p:animEffect>
+                                  </p:childTnLst>
+                                </p:cTn>
+                              </p:par>
+                            </p:childTnLst>
+                          </p:cTn>
+                        </p:par>
+                      </p:childTnLst>
+                    </p:cTn>
+                  </p:par>
+                  <p:par>
+                    <p:cTn id="8" fill="hold">
+                      <p:stCondLst>
+                        <p:cond delay="indefinite"/>
+                      </p:stCondLst>
+                      <p:childTnLst>
+                        <p:par>
+                          <p:cTn id="9" fill="hold">
+                            <p:stCondLst>
+                              <p:cond delay="0"/>
+                            </p:stCondLst>
+                            <p:childTnLst>
+                              <p:par>
+                                <p:cTn id="10" presetID="10" presetClass="entr" presetSubtype="0" fill="hold" nodeType="clickEffect">
+                                  <p:stCondLst>
+                                    <p:cond delay="0"/>
+                                  </p:stCondLst>
+                                  <p:childTnLst>
+                                    <p:set>
+                                      <p:cBhvr>
+                                        <p:cTn id="11" dur="1" fill="hold">
+                                          <p:stCondLst>
+                                            <p:cond delay="0"/>
+                                          </p:stCondLst>
+                                        </p:cTn>
+                                        <p:tgtEl>
+                                          <p:spTgt spid="3">
+                                            <p:txEl>
+                                              <p:pRg st="2" end="2"/>
+                                            </p:txEl>
+                                          </p:spTgt>
+                                        </p:tgtEl>
+                                        <p:attrNameLst>
+                                          <p:attrName>style.visibility</p:attrName>
+                                        </p:attrNameLst>
+                                      </p:cBhvr>
+                                      <p:to>
+                                        <p:strVal val="visible"/>
+                                      </p:to>
+                                    </p:set>
+                                    <p:animEffect transition="in" filter="fade">
+                                      <p:cBhvr>
+                                        <p:cTn id="12" dur="500"/>
+                                        <p:tgtEl>
+                                          <p:spTgt spid="3">
+                                            <p:txEl>
+                                              <p:pRg st="2" end="2"/>
+                                            </p:txEl>
+                                          </p:spTgt>
+                                        </p:tgtEl>
+                                      </p:cBhvr>
+                                    </p:animEffect>
+                                  </p:childTnLst>
+                                </p:cTn>
+                              </p:par>
+                              <p:par>
+                                <p:cTn id="13" presetID="10" presetClass="entr" presetSubtype="0" fill="hold" nodeType="withEffect">
+                                  <p:stCondLst>
+                                    <p:cond delay="0"/>
+                                  </p:stCondLst>
+                                  <p:childTnLst>
+                                    <p:set>
+                                      <p:cBhvr>
+                                        <p:cTn id="14" dur="1" fill="hold">
+                                          <p:stCondLst>
+                                            <p:cond delay="0"/>
+                                          </p:stCondLst>
+                                        </p:cTn>
+                                        <p:tgtEl>
+                                          <p:spTgt spid="3">
+                                            <p:txEl>
+                                              <p:pRg st="3" end="3"/>
+                                            </p:txEl>
+                                          </p:spTgt>
+                                        </p:tgtEl>
+                                        <p:attrNameLst>
+                                          <p:attrName>style.visibility</p:attrName>
+                                        </p:attrNameLst>
+                                      </p:cBhvr>
+                                      <p:to>
+                                        <p:strVal val="visible"/>
+                                      </p:to>
+                                    </p:set>
+                                    <p:animEffect transition="in" filter="fade">
+                                      <p:cBhvr>
+                                        <p:cTn id="15" dur="500"/>
+                                        <p:tgtEl>
+                                          <p:spTgt spid="3">
+                                            <p:txEl>
+                                              <p:pRg st="3" end="3"/>
+                                            </p:txEl>
+                                          </p:spTgt>
+                                        </p:tgtEl>
+                                      </p:cBhvr>
+                                    </p:animEffect>
+                                  </p:childTnLst>
+                                </p:cTn>
+                              </p:par>
+                            </p:childTnLst>
+                          </p:cTn>
+                        </p:par>
+                      </p:childTnLst>
+                    </p:cTn>
+                  </p:par>
+                </p:childTnLst>
+              </p:cTn>
+              <p:prevCondLst>
+                <p:cond evt="onPrev" delay="0">
+                  <p:tgtEl>
+                    <p:sldTgt/>
+                  </p:tgtEl>
+                </p:cond>
+              </p:prevCondLst>
+              <p:nextCondLst>
+                <p:cond evt="onNext" delay="0">
+                  <p:tgtEl>
+                    <p:sldTgt/>
+                  </p:tgtEl>
+                </p:cond>
+              </p:nextCondLst>
+            </p:seq>
+          </p:childTnLst>
+        </p:cTn>
+      </p:par>
+    </p:tnLst>
+  </p:timing>
 </p:sld>
 </file>
 
@@ -4851,7 +5671,12 @@
             <p:ph idx="1"/>
           </p:nvPr>
         </p:nvSpPr>
-        <p:spPr/>
+        <p:spPr>
+          <a:xfrm>
+            <a:off x="1097279" y="1845734"/>
+            <a:ext cx="10212872" cy="4023360"/>
+          </a:xfrm>
+        </p:spPr>
         <p:txBody>
           <a:bodyPr>
             <a:normAutofit/>
@@ -4891,7 +5716,7 @@
               <a:rPr lang="en-GB" sz="2600" dirty="0">
                 <a:latin typeface="Raleway Medium" panose="020B0603030101060003" pitchFamily="34" charset="0"/>
               </a:rPr>
-              <a:t>This is probably due to an estimation error in one of the 2-point stories, since it lasted the same time as the longest of the 3-points ones.</a:t>
+              <a:t>This is probably due to an estimation error in one of the 2-point stories, since it lasted the same time as the longest of the 3-point ones.</a:t>
             </a:r>
           </a:p>
         </p:txBody>
@@ -4906,6 +5731,256 @@
   <p:clrMapOvr>
     <a:masterClrMapping/>
   </p:clrMapOvr>
+  <mc:AlternateContent xmlns:mc="http://schemas.openxmlformats.org/markup-compatibility/2006">
+    <mc:Choice xmlns:p159="http://schemas.microsoft.com/office/powerpoint/2015/09/main" Requires="p159">
+      <p:transition xmlns:p14="http://schemas.microsoft.com/office/powerpoint/2010/main" spd="slow" p14:dur="2000">
+        <p159:morph option="byObject"/>
+      </p:transition>
+    </mc:Choice>
+    <mc:Fallback>
+      <p:transition spd="slow">
+        <p:fade/>
+      </p:transition>
+    </mc:Fallback>
+  </mc:AlternateContent>
+  <p:timing>
+    <p:tnLst>
+      <p:par>
+        <p:cTn id="1" dur="indefinite" restart="never" nodeType="tmRoot">
+          <p:childTnLst>
+            <p:seq concurrent="1" nextAc="seek">
+              <p:cTn id="2" dur="indefinite" nodeType="mainSeq">
+                <p:childTnLst>
+                  <p:par>
+                    <p:cTn id="3" fill="hold">
+                      <p:stCondLst>
+                        <p:cond delay="indefinite"/>
+                      </p:stCondLst>
+                      <p:childTnLst>
+                        <p:par>
+                          <p:cTn id="4" fill="hold">
+                            <p:stCondLst>
+                              <p:cond delay="0"/>
+                            </p:stCondLst>
+                            <p:childTnLst>
+                              <p:par>
+                                <p:cTn id="5" presetID="10" presetClass="entr" presetSubtype="0" fill="hold" nodeType="clickEffect">
+                                  <p:stCondLst>
+                                    <p:cond delay="0"/>
+                                  </p:stCondLst>
+                                  <p:childTnLst>
+                                    <p:set>
+                                      <p:cBhvr>
+                                        <p:cTn id="6" dur="1" fill="hold">
+                                          <p:stCondLst>
+                                            <p:cond delay="0"/>
+                                          </p:stCondLst>
+                                        </p:cTn>
+                                        <p:tgtEl>
+                                          <p:spTgt spid="3">
+                                            <p:txEl>
+                                              <p:pRg st="1" end="1"/>
+                                            </p:txEl>
+                                          </p:spTgt>
+                                        </p:tgtEl>
+                                        <p:attrNameLst>
+                                          <p:attrName>style.visibility</p:attrName>
+                                        </p:attrNameLst>
+                                      </p:cBhvr>
+                                      <p:to>
+                                        <p:strVal val="visible"/>
+                                      </p:to>
+                                    </p:set>
+                                    <p:animEffect transition="in" filter="fade">
+                                      <p:cBhvr>
+                                        <p:cTn id="7" dur="500"/>
+                                        <p:tgtEl>
+                                          <p:spTgt spid="3">
+                                            <p:txEl>
+                                              <p:pRg st="1" end="1"/>
+                                            </p:txEl>
+                                          </p:spTgt>
+                                        </p:tgtEl>
+                                      </p:cBhvr>
+                                    </p:animEffect>
+                                  </p:childTnLst>
+                                </p:cTn>
+                              </p:par>
+                              <p:par>
+                                <p:cTn id="8" presetID="10" presetClass="entr" presetSubtype="0" fill="hold" nodeType="withEffect">
+                                  <p:stCondLst>
+                                    <p:cond delay="0"/>
+                                  </p:stCondLst>
+                                  <p:childTnLst>
+                                    <p:set>
+                                      <p:cBhvr>
+                                        <p:cTn id="9" dur="1" fill="hold">
+                                          <p:stCondLst>
+                                            <p:cond delay="0"/>
+                                          </p:stCondLst>
+                                        </p:cTn>
+                                        <p:tgtEl>
+                                          <p:spTgt spid="3">
+                                            <p:txEl>
+                                              <p:pRg st="2" end="2"/>
+                                            </p:txEl>
+                                          </p:spTgt>
+                                        </p:tgtEl>
+                                        <p:attrNameLst>
+                                          <p:attrName>style.visibility</p:attrName>
+                                        </p:attrNameLst>
+                                      </p:cBhvr>
+                                      <p:to>
+                                        <p:strVal val="visible"/>
+                                      </p:to>
+                                    </p:set>
+                                    <p:animEffect transition="in" filter="fade">
+                                      <p:cBhvr>
+                                        <p:cTn id="10" dur="500"/>
+                                        <p:tgtEl>
+                                          <p:spTgt spid="3">
+                                            <p:txEl>
+                                              <p:pRg st="2" end="2"/>
+                                            </p:txEl>
+                                          </p:spTgt>
+                                        </p:tgtEl>
+                                      </p:cBhvr>
+                                    </p:animEffect>
+                                  </p:childTnLst>
+                                </p:cTn>
+                              </p:par>
+                            </p:childTnLst>
+                          </p:cTn>
+                        </p:par>
+                      </p:childTnLst>
+                    </p:cTn>
+                  </p:par>
+                  <p:par>
+                    <p:cTn id="11" fill="hold">
+                      <p:stCondLst>
+                        <p:cond delay="indefinite"/>
+                      </p:stCondLst>
+                      <p:childTnLst>
+                        <p:par>
+                          <p:cTn id="12" fill="hold">
+                            <p:stCondLst>
+                              <p:cond delay="0"/>
+                            </p:stCondLst>
+                            <p:childTnLst>
+                              <p:par>
+                                <p:cTn id="13" presetID="10" presetClass="entr" presetSubtype="0" fill="hold" nodeType="clickEffect">
+                                  <p:stCondLst>
+                                    <p:cond delay="0"/>
+                                  </p:stCondLst>
+                                  <p:childTnLst>
+                                    <p:set>
+                                      <p:cBhvr>
+                                        <p:cTn id="14" dur="1" fill="hold">
+                                          <p:stCondLst>
+                                            <p:cond delay="0"/>
+                                          </p:stCondLst>
+                                        </p:cTn>
+                                        <p:tgtEl>
+                                          <p:spTgt spid="3">
+                                            <p:txEl>
+                                              <p:pRg st="3" end="3"/>
+                                            </p:txEl>
+                                          </p:spTgt>
+                                        </p:tgtEl>
+                                        <p:attrNameLst>
+                                          <p:attrName>style.visibility</p:attrName>
+                                        </p:attrNameLst>
+                                      </p:cBhvr>
+                                      <p:to>
+                                        <p:strVal val="visible"/>
+                                      </p:to>
+                                    </p:set>
+                                    <p:animEffect transition="in" filter="fade">
+                                      <p:cBhvr>
+                                        <p:cTn id="15" dur="500"/>
+                                        <p:tgtEl>
+                                          <p:spTgt spid="3">
+                                            <p:txEl>
+                                              <p:pRg st="3" end="3"/>
+                                            </p:txEl>
+                                          </p:spTgt>
+                                        </p:tgtEl>
+                                      </p:cBhvr>
+                                    </p:animEffect>
+                                  </p:childTnLst>
+                                </p:cTn>
+                              </p:par>
+                              <p:par>
+                                <p:cTn id="16" presetID="10" presetClass="entr" presetSubtype="0" fill="hold" nodeType="withEffect">
+                                  <p:stCondLst>
+                                    <p:cond delay="0"/>
+                                  </p:stCondLst>
+                                  <p:childTnLst>
+                                    <p:set>
+                                      <p:cBhvr>
+                                        <p:cTn id="17" dur="1" fill="hold">
+                                          <p:stCondLst>
+                                            <p:cond delay="0"/>
+                                          </p:stCondLst>
+                                        </p:cTn>
+                                        <p:tgtEl>
+                                          <p:spTgt spid="3">
+                                            <p:txEl>
+                                              <p:pRg st="4" end="4"/>
+                                            </p:txEl>
+                                          </p:spTgt>
+                                        </p:tgtEl>
+                                        <p:attrNameLst>
+                                          <p:attrName>style.visibility</p:attrName>
+                                        </p:attrNameLst>
+                                      </p:cBhvr>
+                                      <p:to>
+                                        <p:strVal val="visible"/>
+                                      </p:to>
+                                    </p:set>
+                                    <p:animEffect transition="in" filter="fade">
+                                      <p:cBhvr>
+                                        <p:cTn id="18" dur="500"/>
+                                        <p:tgtEl>
+                                          <p:spTgt spid="3">
+                                            <p:txEl>
+                                              <p:pRg st="4" end="4"/>
+                                            </p:txEl>
+                                          </p:spTgt>
+                                        </p:tgtEl>
+                                      </p:cBhvr>
+                                    </p:animEffect>
+                                  </p:childTnLst>
+                                </p:cTn>
+                              </p:par>
+                            </p:childTnLst>
+                          </p:cTn>
+                        </p:par>
+                      </p:childTnLst>
+                    </p:cTn>
+                  </p:par>
+                </p:childTnLst>
+              </p:cTn>
+              <p:prevCondLst>
+                <p:cond evt="onPrev" delay="0">
+                  <p:tgtEl>
+                    <p:sldTgt/>
+                  </p:tgtEl>
+                </p:cond>
+              </p:prevCondLst>
+              <p:nextCondLst>
+                <p:cond evt="onNext" delay="0">
+                  <p:tgtEl>
+                    <p:sldTgt/>
+                  </p:tgtEl>
+                </p:cond>
+              </p:nextCondLst>
+            </p:seq>
+          </p:childTnLst>
+        </p:cTn>
+      </p:par>
+    </p:tnLst>
+  </p:timing>
 </p:sld>
 </file>
 
@@ -5011,6 +6086,170 @@
   <p:clrMapOvr>
     <a:masterClrMapping/>
   </p:clrMapOvr>
+  <mc:AlternateContent xmlns:mc="http://schemas.openxmlformats.org/markup-compatibility/2006">
+    <mc:Choice xmlns:p159="http://schemas.microsoft.com/office/powerpoint/2015/09/main" Requires="p159">
+      <p:transition xmlns:p14="http://schemas.microsoft.com/office/powerpoint/2010/main" spd="slow" p14:dur="2000">
+        <p159:morph option="byObject"/>
+      </p:transition>
+    </mc:Choice>
+    <mc:Fallback>
+      <p:transition spd="slow">
+        <p:fade/>
+      </p:transition>
+    </mc:Fallback>
+  </mc:AlternateContent>
+  <p:timing>
+    <p:tnLst>
+      <p:par>
+        <p:cTn id="1" dur="indefinite" restart="never" nodeType="tmRoot">
+          <p:childTnLst>
+            <p:seq concurrent="1" nextAc="seek">
+              <p:cTn id="2" dur="indefinite" nodeType="mainSeq">
+                <p:childTnLst>
+                  <p:par>
+                    <p:cTn id="3" fill="hold">
+                      <p:stCondLst>
+                        <p:cond delay="indefinite"/>
+                      </p:stCondLst>
+                      <p:childTnLst>
+                        <p:par>
+                          <p:cTn id="4" fill="hold">
+                            <p:stCondLst>
+                              <p:cond delay="0"/>
+                            </p:stCondLst>
+                            <p:childTnLst>
+                              <p:par>
+                                <p:cTn id="5" presetID="10" presetClass="entr" presetSubtype="0" fill="hold" nodeType="clickEffect">
+                                  <p:stCondLst>
+                                    <p:cond delay="0"/>
+                                  </p:stCondLst>
+                                  <p:childTnLst>
+                                    <p:set>
+                                      <p:cBhvr>
+                                        <p:cTn id="6" dur="1" fill="hold">
+                                          <p:stCondLst>
+                                            <p:cond delay="0"/>
+                                          </p:stCondLst>
+                                        </p:cTn>
+                                        <p:tgtEl>
+                                          <p:spTgt spid="3">
+                                            <p:txEl>
+                                              <p:pRg st="1" end="1"/>
+                                            </p:txEl>
+                                          </p:spTgt>
+                                        </p:tgtEl>
+                                        <p:attrNameLst>
+                                          <p:attrName>style.visibility</p:attrName>
+                                        </p:attrNameLst>
+                                      </p:cBhvr>
+                                      <p:to>
+                                        <p:strVal val="visible"/>
+                                      </p:to>
+                                    </p:set>
+                                    <p:animEffect transition="in" filter="fade">
+                                      <p:cBhvr>
+                                        <p:cTn id="7" dur="500"/>
+                                        <p:tgtEl>
+                                          <p:spTgt spid="3">
+                                            <p:txEl>
+                                              <p:pRg st="1" end="1"/>
+                                            </p:txEl>
+                                          </p:spTgt>
+                                        </p:tgtEl>
+                                      </p:cBhvr>
+                                    </p:animEffect>
+                                  </p:childTnLst>
+                                </p:cTn>
+                              </p:par>
+                            </p:childTnLst>
+                          </p:cTn>
+                        </p:par>
+                      </p:childTnLst>
+                    </p:cTn>
+                  </p:par>
+                  <p:par>
+                    <p:cTn id="8" fill="hold">
+                      <p:stCondLst>
+                        <p:cond delay="indefinite"/>
+                      </p:stCondLst>
+                      <p:childTnLst>
+                        <p:par>
+                          <p:cTn id="9" fill="hold">
+                            <p:stCondLst>
+                              <p:cond delay="0"/>
+                            </p:stCondLst>
+                            <p:childTnLst>
+                              <p:par>
+                                <p:cTn id="10" presetID="10" presetClass="entr" presetSubtype="0" fill="hold" nodeType="clickEffect">
+                                  <p:stCondLst>
+                                    <p:cond delay="0"/>
+                                  </p:stCondLst>
+                                  <p:childTnLst>
+                                    <p:set>
+                                      <p:cBhvr>
+                                        <p:cTn id="11" dur="1" fill="hold">
+                                          <p:stCondLst>
+                                            <p:cond delay="0"/>
+                                          </p:stCondLst>
+                                        </p:cTn>
+                                        <p:tgtEl>
+                                          <p:spTgt spid="3">
+                                            <p:txEl>
+                                              <p:pRg st="2" end="2"/>
+                                            </p:txEl>
+                                          </p:spTgt>
+                                        </p:tgtEl>
+                                        <p:attrNameLst>
+                                          <p:attrName>style.visibility</p:attrName>
+                                        </p:attrNameLst>
+                                      </p:cBhvr>
+                                      <p:to>
+                                        <p:strVal val="visible"/>
+                                      </p:to>
+                                    </p:set>
+                                    <p:animEffect transition="in" filter="fade">
+                                      <p:cBhvr>
+                                        <p:cTn id="12" dur="500"/>
+                                        <p:tgtEl>
+                                          <p:spTgt spid="3">
+                                            <p:txEl>
+                                              <p:pRg st="2" end="2"/>
+                                            </p:txEl>
+                                          </p:spTgt>
+                                        </p:tgtEl>
+                                      </p:cBhvr>
+                                    </p:animEffect>
+                                  </p:childTnLst>
+                                </p:cTn>
+                              </p:par>
+                            </p:childTnLst>
+                          </p:cTn>
+                        </p:par>
+                      </p:childTnLst>
+                    </p:cTn>
+                  </p:par>
+                </p:childTnLst>
+              </p:cTn>
+              <p:prevCondLst>
+                <p:cond evt="onPrev" delay="0">
+                  <p:tgtEl>
+                    <p:sldTgt/>
+                  </p:tgtEl>
+                </p:cond>
+              </p:prevCondLst>
+              <p:nextCondLst>
+                <p:cond evt="onNext" delay="0">
+                  <p:tgtEl>
+                    <p:sldTgt/>
+                  </p:tgtEl>
+                </p:cond>
+              </p:nextCondLst>
+            </p:seq>
+          </p:childTnLst>
+        </p:cTn>
+      </p:par>
+    </p:tnLst>
+  </p:timing>
 </p:sld>
 </file>
 
@@ -5136,6 +6375,231 @@
   <p:clrMapOvr>
     <a:masterClrMapping/>
   </p:clrMapOvr>
+  <mc:AlternateContent xmlns:mc="http://schemas.openxmlformats.org/markup-compatibility/2006">
+    <mc:Choice xmlns:p159="http://schemas.microsoft.com/office/powerpoint/2015/09/main" Requires="p159">
+      <p:transition xmlns:p14="http://schemas.microsoft.com/office/powerpoint/2010/main" spd="slow" p14:dur="2000">
+        <p159:morph option="byObject"/>
+      </p:transition>
+    </mc:Choice>
+    <mc:Fallback>
+      <p:transition spd="slow">
+        <p:fade/>
+      </p:transition>
+    </mc:Fallback>
+  </mc:AlternateContent>
+  <p:timing>
+    <p:tnLst>
+      <p:par>
+        <p:cTn id="1" dur="indefinite" restart="never" nodeType="tmRoot">
+          <p:childTnLst>
+            <p:seq concurrent="1" nextAc="seek">
+              <p:cTn id="2" dur="indefinite" nodeType="mainSeq">
+                <p:childTnLst>
+                  <p:par>
+                    <p:cTn id="3" fill="hold">
+                      <p:stCondLst>
+                        <p:cond delay="indefinite"/>
+                      </p:stCondLst>
+                      <p:childTnLst>
+                        <p:par>
+                          <p:cTn id="4" fill="hold">
+                            <p:stCondLst>
+                              <p:cond delay="0"/>
+                            </p:stCondLst>
+                            <p:childTnLst>
+                              <p:par>
+                                <p:cTn id="5" presetID="10" presetClass="entr" presetSubtype="0" fill="hold" nodeType="clickEffect">
+                                  <p:stCondLst>
+                                    <p:cond delay="0"/>
+                                  </p:stCondLst>
+                                  <p:childTnLst>
+                                    <p:set>
+                                      <p:cBhvr>
+                                        <p:cTn id="6" dur="1" fill="hold">
+                                          <p:stCondLst>
+                                            <p:cond delay="0"/>
+                                          </p:stCondLst>
+                                        </p:cTn>
+                                        <p:tgtEl>
+                                          <p:spTgt spid="3">
+                                            <p:txEl>
+                                              <p:pRg st="1" end="1"/>
+                                            </p:txEl>
+                                          </p:spTgt>
+                                        </p:tgtEl>
+                                        <p:attrNameLst>
+                                          <p:attrName>style.visibility</p:attrName>
+                                        </p:attrNameLst>
+                                      </p:cBhvr>
+                                      <p:to>
+                                        <p:strVal val="visible"/>
+                                      </p:to>
+                                    </p:set>
+                                    <p:animEffect transition="in" filter="fade">
+                                      <p:cBhvr>
+                                        <p:cTn id="7" dur="500"/>
+                                        <p:tgtEl>
+                                          <p:spTgt spid="3">
+                                            <p:txEl>
+                                              <p:pRg st="1" end="1"/>
+                                            </p:txEl>
+                                          </p:spTgt>
+                                        </p:tgtEl>
+                                      </p:cBhvr>
+                                    </p:animEffect>
+                                  </p:childTnLst>
+                                </p:cTn>
+                              </p:par>
+                            </p:childTnLst>
+                          </p:cTn>
+                        </p:par>
+                      </p:childTnLst>
+                    </p:cTn>
+                  </p:par>
+                  <p:par>
+                    <p:cTn id="8" fill="hold">
+                      <p:stCondLst>
+                        <p:cond delay="indefinite"/>
+                      </p:stCondLst>
+                      <p:childTnLst>
+                        <p:par>
+                          <p:cTn id="9" fill="hold">
+                            <p:stCondLst>
+                              <p:cond delay="0"/>
+                            </p:stCondLst>
+                            <p:childTnLst>
+                              <p:par>
+                                <p:cTn id="10" presetID="10" presetClass="entr" presetSubtype="0" fill="hold" nodeType="clickEffect">
+                                  <p:stCondLst>
+                                    <p:cond delay="0"/>
+                                  </p:stCondLst>
+                                  <p:childTnLst>
+                                    <p:set>
+                                      <p:cBhvr>
+                                        <p:cTn id="11" dur="1" fill="hold">
+                                          <p:stCondLst>
+                                            <p:cond delay="0"/>
+                                          </p:stCondLst>
+                                        </p:cTn>
+                                        <p:tgtEl>
+                                          <p:spTgt spid="3">
+                                            <p:txEl>
+                                              <p:pRg st="2" end="2"/>
+                                            </p:txEl>
+                                          </p:spTgt>
+                                        </p:tgtEl>
+                                        <p:attrNameLst>
+                                          <p:attrName>style.visibility</p:attrName>
+                                        </p:attrNameLst>
+                                      </p:cBhvr>
+                                      <p:to>
+                                        <p:strVal val="visible"/>
+                                      </p:to>
+                                    </p:set>
+                                    <p:animEffect transition="in" filter="fade">
+                                      <p:cBhvr>
+                                        <p:cTn id="12" dur="500"/>
+                                        <p:tgtEl>
+                                          <p:spTgt spid="3">
+                                            <p:txEl>
+                                              <p:pRg st="2" end="2"/>
+                                            </p:txEl>
+                                          </p:spTgt>
+                                        </p:tgtEl>
+                                      </p:cBhvr>
+                                    </p:animEffect>
+                                  </p:childTnLst>
+                                </p:cTn>
+                              </p:par>
+                            </p:childTnLst>
+                          </p:cTn>
+                        </p:par>
+                      </p:childTnLst>
+                    </p:cTn>
+                  </p:par>
+                  <p:par>
+                    <p:cTn id="13" fill="hold">
+                      <p:stCondLst>
+                        <p:cond delay="indefinite"/>
+                      </p:stCondLst>
+                      <p:childTnLst>
+                        <p:par>
+                          <p:cTn id="14" fill="hold">
+                            <p:stCondLst>
+                              <p:cond delay="0"/>
+                            </p:stCondLst>
+                            <p:childTnLst>
+                              <p:par>
+                                <p:cTn id="15" presetID="10" presetClass="entr" presetSubtype="0" fill="hold" nodeType="clickEffect">
+                                  <p:stCondLst>
+                                    <p:cond delay="0"/>
+                                  </p:stCondLst>
+                                  <p:childTnLst>
+                                    <p:set>
+                                      <p:cBhvr>
+                                        <p:cTn id="16" dur="1" fill="hold">
+                                          <p:stCondLst>
+                                            <p:cond delay="0"/>
+                                          </p:stCondLst>
+                                        </p:cTn>
+                                        <p:tgtEl>
+                                          <p:spTgt spid="3">
+                                            <p:txEl>
+                                              <p:pRg st="3" end="3"/>
+                                            </p:txEl>
+                                          </p:spTgt>
+                                        </p:tgtEl>
+                                        <p:attrNameLst>
+                                          <p:attrName>style.visibility</p:attrName>
+                                        </p:attrNameLst>
+                                      </p:cBhvr>
+                                      <p:to>
+                                        <p:strVal val="visible"/>
+                                      </p:to>
+                                    </p:set>
+                                    <p:animEffect transition="in" filter="fade">
+                                      <p:cBhvr>
+                                        <p:cTn id="17" dur="500"/>
+                                        <p:tgtEl>
+                                          <p:spTgt spid="3">
+                                            <p:txEl>
+                                              <p:pRg st="3" end="3"/>
+                                            </p:txEl>
+                                          </p:spTgt>
+                                        </p:tgtEl>
+                                      </p:cBhvr>
+                                    </p:animEffect>
+                                  </p:childTnLst>
+                                </p:cTn>
+                              </p:par>
+                            </p:childTnLst>
+                          </p:cTn>
+                        </p:par>
+                      </p:childTnLst>
+                    </p:cTn>
+                  </p:par>
+                </p:childTnLst>
+              </p:cTn>
+              <p:prevCondLst>
+                <p:cond evt="onPrev" delay="0">
+                  <p:tgtEl>
+                    <p:sldTgt/>
+                  </p:tgtEl>
+                </p:cond>
+              </p:prevCondLst>
+              <p:nextCondLst>
+                <p:cond evt="onNext" delay="0">
+                  <p:tgtEl>
+                    <p:sldTgt/>
+                  </p:tgtEl>
+                </p:cond>
+              </p:nextCondLst>
+            </p:seq>
+          </p:childTnLst>
+        </p:cTn>
+      </p:par>
+    </p:tnLst>
+  </p:timing>
 </p:sld>
 </file>
 
@@ -5246,19 +6710,7 @@
               <a:rPr lang="en-GB" sz="2600" dirty="0">
                 <a:latin typeface="Raleway Medium" panose="020B0603030101060003" pitchFamily="34" charset="0"/>
               </a:rPr>
-              <a:t>An </a:t>
-            </a:r>
-            <a:r>
-              <a:rPr lang="en-GB" sz="2600">
-                <a:latin typeface="Raleway Medium" panose="020B0603030101060003" pitchFamily="34" charset="0"/>
-              </a:rPr>
-              <a:t>off-by-1 error </a:t>
-            </a:r>
-            <a:r>
-              <a:rPr lang="en-GB" sz="2600" dirty="0">
-                <a:latin typeface="Raleway Medium" panose="020B0603030101060003" pitchFamily="34" charset="0"/>
-              </a:rPr>
-              <a:t>that no one noticed.</a:t>
+              <a:t>An off-by-1 error that no one noticed.</a:t>
             </a:r>
           </a:p>
         </p:txBody>
@@ -5273,6 +6725,231 @@
   <p:clrMapOvr>
     <a:masterClrMapping/>
   </p:clrMapOvr>
+  <mc:AlternateContent xmlns:mc="http://schemas.openxmlformats.org/markup-compatibility/2006">
+    <mc:Choice xmlns:p159="http://schemas.microsoft.com/office/powerpoint/2015/09/main" Requires="p159">
+      <p:transition xmlns:p14="http://schemas.microsoft.com/office/powerpoint/2010/main" spd="slow" p14:dur="2000">
+        <p159:morph option="byObject"/>
+      </p:transition>
+    </mc:Choice>
+    <mc:Fallback>
+      <p:transition spd="slow">
+        <p:fade/>
+      </p:transition>
+    </mc:Fallback>
+  </mc:AlternateContent>
+  <p:timing>
+    <p:tnLst>
+      <p:par>
+        <p:cTn id="1" dur="indefinite" restart="never" nodeType="tmRoot">
+          <p:childTnLst>
+            <p:seq concurrent="1" nextAc="seek">
+              <p:cTn id="2" dur="indefinite" nodeType="mainSeq">
+                <p:childTnLst>
+                  <p:par>
+                    <p:cTn id="3" fill="hold">
+                      <p:stCondLst>
+                        <p:cond delay="indefinite"/>
+                      </p:stCondLst>
+                      <p:childTnLst>
+                        <p:par>
+                          <p:cTn id="4" fill="hold">
+                            <p:stCondLst>
+                              <p:cond delay="0"/>
+                            </p:stCondLst>
+                            <p:childTnLst>
+                              <p:par>
+                                <p:cTn id="5" presetID="10" presetClass="entr" presetSubtype="0" fill="hold" nodeType="clickEffect">
+                                  <p:stCondLst>
+                                    <p:cond delay="0"/>
+                                  </p:stCondLst>
+                                  <p:childTnLst>
+                                    <p:set>
+                                      <p:cBhvr>
+                                        <p:cTn id="6" dur="1" fill="hold">
+                                          <p:stCondLst>
+                                            <p:cond delay="0"/>
+                                          </p:stCondLst>
+                                        </p:cTn>
+                                        <p:tgtEl>
+                                          <p:spTgt spid="3">
+                                            <p:txEl>
+                                              <p:pRg st="1" end="1"/>
+                                            </p:txEl>
+                                          </p:spTgt>
+                                        </p:tgtEl>
+                                        <p:attrNameLst>
+                                          <p:attrName>style.visibility</p:attrName>
+                                        </p:attrNameLst>
+                                      </p:cBhvr>
+                                      <p:to>
+                                        <p:strVal val="visible"/>
+                                      </p:to>
+                                    </p:set>
+                                    <p:animEffect transition="in" filter="fade">
+                                      <p:cBhvr>
+                                        <p:cTn id="7" dur="500"/>
+                                        <p:tgtEl>
+                                          <p:spTgt spid="3">
+                                            <p:txEl>
+                                              <p:pRg st="1" end="1"/>
+                                            </p:txEl>
+                                          </p:spTgt>
+                                        </p:tgtEl>
+                                      </p:cBhvr>
+                                    </p:animEffect>
+                                  </p:childTnLst>
+                                </p:cTn>
+                              </p:par>
+                            </p:childTnLst>
+                          </p:cTn>
+                        </p:par>
+                      </p:childTnLst>
+                    </p:cTn>
+                  </p:par>
+                  <p:par>
+                    <p:cTn id="8" fill="hold">
+                      <p:stCondLst>
+                        <p:cond delay="indefinite"/>
+                      </p:stCondLst>
+                      <p:childTnLst>
+                        <p:par>
+                          <p:cTn id="9" fill="hold">
+                            <p:stCondLst>
+                              <p:cond delay="0"/>
+                            </p:stCondLst>
+                            <p:childTnLst>
+                              <p:par>
+                                <p:cTn id="10" presetID="10" presetClass="entr" presetSubtype="0" fill="hold" nodeType="clickEffect">
+                                  <p:stCondLst>
+                                    <p:cond delay="0"/>
+                                  </p:stCondLst>
+                                  <p:childTnLst>
+                                    <p:set>
+                                      <p:cBhvr>
+                                        <p:cTn id="11" dur="1" fill="hold">
+                                          <p:stCondLst>
+                                            <p:cond delay="0"/>
+                                          </p:stCondLst>
+                                        </p:cTn>
+                                        <p:tgtEl>
+                                          <p:spTgt spid="3">
+                                            <p:txEl>
+                                              <p:pRg st="2" end="2"/>
+                                            </p:txEl>
+                                          </p:spTgt>
+                                        </p:tgtEl>
+                                        <p:attrNameLst>
+                                          <p:attrName>style.visibility</p:attrName>
+                                        </p:attrNameLst>
+                                      </p:cBhvr>
+                                      <p:to>
+                                        <p:strVal val="visible"/>
+                                      </p:to>
+                                    </p:set>
+                                    <p:animEffect transition="in" filter="fade">
+                                      <p:cBhvr>
+                                        <p:cTn id="12" dur="500"/>
+                                        <p:tgtEl>
+                                          <p:spTgt spid="3">
+                                            <p:txEl>
+                                              <p:pRg st="2" end="2"/>
+                                            </p:txEl>
+                                          </p:spTgt>
+                                        </p:tgtEl>
+                                      </p:cBhvr>
+                                    </p:animEffect>
+                                  </p:childTnLst>
+                                </p:cTn>
+                              </p:par>
+                            </p:childTnLst>
+                          </p:cTn>
+                        </p:par>
+                      </p:childTnLst>
+                    </p:cTn>
+                  </p:par>
+                  <p:par>
+                    <p:cTn id="13" fill="hold">
+                      <p:stCondLst>
+                        <p:cond delay="indefinite"/>
+                      </p:stCondLst>
+                      <p:childTnLst>
+                        <p:par>
+                          <p:cTn id="14" fill="hold">
+                            <p:stCondLst>
+                              <p:cond delay="0"/>
+                            </p:stCondLst>
+                            <p:childTnLst>
+                              <p:par>
+                                <p:cTn id="15" presetID="10" presetClass="entr" presetSubtype="0" fill="hold" nodeType="clickEffect">
+                                  <p:stCondLst>
+                                    <p:cond delay="0"/>
+                                  </p:stCondLst>
+                                  <p:childTnLst>
+                                    <p:set>
+                                      <p:cBhvr>
+                                        <p:cTn id="16" dur="1" fill="hold">
+                                          <p:stCondLst>
+                                            <p:cond delay="0"/>
+                                          </p:stCondLst>
+                                        </p:cTn>
+                                        <p:tgtEl>
+                                          <p:spTgt spid="3">
+                                            <p:txEl>
+                                              <p:pRg st="3" end="3"/>
+                                            </p:txEl>
+                                          </p:spTgt>
+                                        </p:tgtEl>
+                                        <p:attrNameLst>
+                                          <p:attrName>style.visibility</p:attrName>
+                                        </p:attrNameLst>
+                                      </p:cBhvr>
+                                      <p:to>
+                                        <p:strVal val="visible"/>
+                                      </p:to>
+                                    </p:set>
+                                    <p:animEffect transition="in" filter="fade">
+                                      <p:cBhvr>
+                                        <p:cTn id="17" dur="500"/>
+                                        <p:tgtEl>
+                                          <p:spTgt spid="3">
+                                            <p:txEl>
+                                              <p:pRg st="3" end="3"/>
+                                            </p:txEl>
+                                          </p:spTgt>
+                                        </p:tgtEl>
+                                      </p:cBhvr>
+                                    </p:animEffect>
+                                  </p:childTnLst>
+                                </p:cTn>
+                              </p:par>
+                            </p:childTnLst>
+                          </p:cTn>
+                        </p:par>
+                      </p:childTnLst>
+                    </p:cTn>
+                  </p:par>
+                </p:childTnLst>
+              </p:cTn>
+              <p:prevCondLst>
+                <p:cond evt="onPrev" delay="0">
+                  <p:tgtEl>
+                    <p:sldTgt/>
+                  </p:tgtEl>
+                </p:cond>
+              </p:prevCondLst>
+              <p:nextCondLst>
+                <p:cond evt="onNext" delay="0">
+                  <p:tgtEl>
+                    <p:sldTgt/>
+                  </p:tgtEl>
+                </p:cond>
+              </p:nextCondLst>
+            </p:seq>
+          </p:childTnLst>
+        </p:cTn>
+      </p:par>
+    </p:tnLst>
+  </p:timing>
 </p:sld>
 </file>
 
@@ -5510,6 +7187,18 @@
   <p:clrMapOvr>
     <a:masterClrMapping/>
   </p:clrMapOvr>
+  <mc:AlternateContent xmlns:mc="http://schemas.openxmlformats.org/markup-compatibility/2006">
+    <mc:Choice xmlns:p159="http://schemas.microsoft.com/office/powerpoint/2015/09/main" Requires="p159">
+      <p:transition xmlns:p14="http://schemas.microsoft.com/office/powerpoint/2010/main" spd="slow" p14:dur="2000">
+        <p159:morph option="byObject"/>
+      </p:transition>
+    </mc:Choice>
+    <mc:Fallback>
+      <p:transition spd="slow">
+        <p:fade/>
+      </p:transition>
+    </mc:Fallback>
+  </mc:AlternateContent>
 </p:sld>
 </file>
 

</xml_diff>

<commit_message>
Added slide with hour/points
</commit_message>
<xml_diff>
--- a/sprint_retrospective.pptx
+++ b/sprint_retrospective.pptx
@@ -5,7 +5,7 @@
     <p:sldMasterId id="2147483896" r:id="rId1"/>
   </p:sldMasterIdLst>
   <p:notesMasterIdLst>
-    <p:notesMasterId r:id="rId11"/>
+    <p:notesMasterId r:id="rId12"/>
   </p:notesMasterIdLst>
   <p:sldIdLst>
     <p:sldId id="256" r:id="rId2"/>
@@ -13,10 +13,11 @@
     <p:sldId id="258" r:id="rId4"/>
     <p:sldId id="259" r:id="rId5"/>
     <p:sldId id="260" r:id="rId6"/>
-    <p:sldId id="261" r:id="rId7"/>
-    <p:sldId id="262" r:id="rId8"/>
-    <p:sldId id="263" r:id="rId9"/>
-    <p:sldId id="264" r:id="rId10"/>
+    <p:sldId id="265" r:id="rId7"/>
+    <p:sldId id="261" r:id="rId8"/>
+    <p:sldId id="262" r:id="rId9"/>
+    <p:sldId id="263" r:id="rId10"/>
+    <p:sldId id="264" r:id="rId11"/>
   </p:sldIdLst>
   <p:sldSz cx="12192000" cy="6858000"/>
   <p:notesSz cx="6858000" cy="9144000"/>
@@ -115,6 +116,14 @@
       </a:defRPr>
     </a:lvl9pPr>
   </p:defaultTextStyle>
+  <p:extLst>
+    <p:ext uri="{EFAFB233-063F-42B5-8137-9DF3F51BA10A}">
+      <p15:sldGuideLst xmlns:p15="http://schemas.microsoft.com/office/powerpoint/2012/main"/>
+    </p:ext>
+    <p:ext uri="{2D200454-40CA-4A62-9FC3-DE9A4176ACB9}">
+      <p15:notesGuideLst xmlns:p15="http://schemas.microsoft.com/office/powerpoint/2012/main"/>
+    </p:ext>
+  </p:extLst>
 </p:presentation>
 </file>
 
@@ -789,13 +798,13 @@
   <p:clrMapOvr>
     <a:masterClrMapping/>
   </p:clrMapOvr>
-  <mc:AlternateContent xmlns:mc="http://schemas.openxmlformats.org/markup-compatibility/2006">
-    <mc:Choice xmlns:p159="http://schemas.microsoft.com/office/powerpoint/2015/09/main" Requires="p159">
+  <mc:AlternateContent xmlns:mc="http://schemas.openxmlformats.org/markup-compatibility/2006" xmlns:p159="http://schemas.microsoft.com/office/powerpoint/2015/09/main">
+    <mc:Choice Requires="p159">
       <p:transition xmlns:p14="http://schemas.microsoft.com/office/powerpoint/2010/main" spd="slow" p14:dur="2000">
         <p159:morph option="byObject"/>
       </p:transition>
     </mc:Choice>
-    <mc:Fallback>
+    <mc:Fallback xmlns="">
       <p:transition spd="slow">
         <p:fade/>
       </p:transition>
@@ -971,13 +980,13 @@
   <p:clrMapOvr>
     <a:masterClrMapping/>
   </p:clrMapOvr>
-  <mc:AlternateContent xmlns:mc="http://schemas.openxmlformats.org/markup-compatibility/2006">
-    <mc:Choice xmlns:p159="http://schemas.microsoft.com/office/powerpoint/2015/09/main" Requires="p159">
+  <mc:AlternateContent xmlns:mc="http://schemas.openxmlformats.org/markup-compatibility/2006" xmlns:p159="http://schemas.microsoft.com/office/powerpoint/2015/09/main">
+    <mc:Choice Requires="p159">
       <p:transition xmlns:p14="http://schemas.microsoft.com/office/powerpoint/2010/main" spd="slow" p14:dur="2000">
         <p159:morph option="byObject"/>
       </p:transition>
     </mc:Choice>
-    <mc:Fallback>
+    <mc:Fallback xmlns="">
       <p:transition spd="slow">
         <p:fade/>
       </p:transition>
@@ -1239,13 +1248,13 @@
   <p:clrMapOvr>
     <a:masterClrMapping/>
   </p:clrMapOvr>
-  <mc:AlternateContent xmlns:mc="http://schemas.openxmlformats.org/markup-compatibility/2006">
-    <mc:Choice xmlns:p159="http://schemas.microsoft.com/office/powerpoint/2015/09/main" Requires="p159">
+  <mc:AlternateContent xmlns:mc="http://schemas.openxmlformats.org/markup-compatibility/2006" xmlns:p159="http://schemas.microsoft.com/office/powerpoint/2015/09/main">
+    <mc:Choice Requires="p159">
       <p:transition xmlns:p14="http://schemas.microsoft.com/office/powerpoint/2010/main" spd="slow" p14:dur="2000">
         <p159:morph option="byObject"/>
       </p:transition>
     </mc:Choice>
-    <mc:Fallback>
+    <mc:Fallback xmlns="">
       <p:transition spd="slow">
         <p:fade/>
       </p:transition>
@@ -1425,13 +1434,13 @@
   <p:clrMapOvr>
     <a:masterClrMapping/>
   </p:clrMapOvr>
-  <mc:AlternateContent xmlns:mc="http://schemas.openxmlformats.org/markup-compatibility/2006">
-    <mc:Choice xmlns:p159="http://schemas.microsoft.com/office/powerpoint/2015/09/main" Requires="p159">
+  <mc:AlternateContent xmlns:mc="http://schemas.openxmlformats.org/markup-compatibility/2006" xmlns:p159="http://schemas.microsoft.com/office/powerpoint/2015/09/main">
+    <mc:Choice Requires="p159">
       <p:transition xmlns:p14="http://schemas.microsoft.com/office/powerpoint/2010/main" spd="slow" p14:dur="2000">
         <p159:morph option="byObject"/>
       </p:transition>
     </mc:Choice>
-    <mc:Fallback>
+    <mc:Fallback xmlns="">
       <p:transition spd="slow">
         <p:fade/>
       </p:transition>
@@ -1810,13 +1819,13 @@
   <p:clrMapOvr>
     <a:masterClrMapping/>
   </p:clrMapOvr>
-  <mc:AlternateContent xmlns:mc="http://schemas.openxmlformats.org/markup-compatibility/2006">
-    <mc:Choice xmlns:p159="http://schemas.microsoft.com/office/powerpoint/2015/09/main" Requires="p159">
+  <mc:AlternateContent xmlns:mc="http://schemas.openxmlformats.org/markup-compatibility/2006" xmlns:p159="http://schemas.microsoft.com/office/powerpoint/2015/09/main">
+    <mc:Choice Requires="p159">
       <p:transition xmlns:p14="http://schemas.microsoft.com/office/powerpoint/2010/main" spd="slow" p14:dur="2000">
         <p159:morph option="byObject"/>
       </p:transition>
     </mc:Choice>
-    <mc:Fallback>
+    <mc:Fallback xmlns="">
       <p:transition spd="slow">
         <p:fade/>
       </p:transition>
@@ -2059,13 +2068,13 @@
   <p:clrMapOvr>
     <a:masterClrMapping/>
   </p:clrMapOvr>
-  <mc:AlternateContent xmlns:mc="http://schemas.openxmlformats.org/markup-compatibility/2006">
-    <mc:Choice xmlns:p159="http://schemas.microsoft.com/office/powerpoint/2015/09/main" Requires="p159">
+  <mc:AlternateContent xmlns:mc="http://schemas.openxmlformats.org/markup-compatibility/2006" xmlns:p159="http://schemas.microsoft.com/office/powerpoint/2015/09/main">
+    <mc:Choice Requires="p159">
       <p:transition xmlns:p14="http://schemas.microsoft.com/office/powerpoint/2010/main" spd="slow" p14:dur="2000">
         <p159:morph option="byObject"/>
       </p:transition>
     </mc:Choice>
-    <mc:Fallback>
+    <mc:Fallback xmlns="">
       <p:transition spd="slow">
         <p:fade/>
       </p:transition>
@@ -2450,13 +2459,13 @@
   <p:clrMapOvr>
     <a:masterClrMapping/>
   </p:clrMapOvr>
-  <mc:AlternateContent xmlns:mc="http://schemas.openxmlformats.org/markup-compatibility/2006">
-    <mc:Choice xmlns:p159="http://schemas.microsoft.com/office/powerpoint/2015/09/main" Requires="p159">
+  <mc:AlternateContent xmlns:mc="http://schemas.openxmlformats.org/markup-compatibility/2006" xmlns:p159="http://schemas.microsoft.com/office/powerpoint/2015/09/main">
+    <mc:Choice Requires="p159">
       <p:transition xmlns:p14="http://schemas.microsoft.com/office/powerpoint/2010/main" spd="slow" p14:dur="2000">
         <p159:morph option="byObject"/>
       </p:transition>
     </mc:Choice>
-    <mc:Fallback>
+    <mc:Fallback xmlns="">
       <p:transition spd="slow">
         <p:fade/>
       </p:transition>
@@ -2580,13 +2589,13 @@
   <p:clrMapOvr>
     <a:masterClrMapping/>
   </p:clrMapOvr>
-  <mc:AlternateContent xmlns:mc="http://schemas.openxmlformats.org/markup-compatibility/2006">
-    <mc:Choice xmlns:p159="http://schemas.microsoft.com/office/powerpoint/2015/09/main" Requires="p159">
+  <mc:AlternateContent xmlns:mc="http://schemas.openxmlformats.org/markup-compatibility/2006" xmlns:p159="http://schemas.microsoft.com/office/powerpoint/2015/09/main">
+    <mc:Choice Requires="p159">
       <p:transition xmlns:p14="http://schemas.microsoft.com/office/powerpoint/2010/main" spd="slow" p14:dur="2000">
         <p159:morph option="byObject"/>
       </p:transition>
     </mc:Choice>
-    <mc:Fallback>
+    <mc:Fallback xmlns="">
       <p:transition spd="slow">
         <p:fade/>
       </p:transition>
@@ -2771,13 +2780,13 @@
   <p:clrMapOvr>
     <a:masterClrMapping/>
   </p:clrMapOvr>
-  <mc:AlternateContent xmlns:mc="http://schemas.openxmlformats.org/markup-compatibility/2006">
-    <mc:Choice xmlns:p159="http://schemas.microsoft.com/office/powerpoint/2015/09/main" Requires="p159">
+  <mc:AlternateContent xmlns:mc="http://schemas.openxmlformats.org/markup-compatibility/2006" xmlns:p159="http://schemas.microsoft.com/office/powerpoint/2015/09/main">
+    <mc:Choice Requires="p159">
       <p:transition xmlns:p14="http://schemas.microsoft.com/office/powerpoint/2010/main" spd="slow" p14:dur="2000">
         <p159:morph option="byObject"/>
       </p:transition>
     </mc:Choice>
-    <mc:Fallback>
+    <mc:Fallback xmlns="">
       <p:transition spd="slow">
         <p:fade/>
       </p:transition>
@@ -3150,13 +3159,13 @@
   <p:clrMapOvr>
     <a:masterClrMapping/>
   </p:clrMapOvr>
-  <mc:AlternateContent xmlns:mc="http://schemas.openxmlformats.org/markup-compatibility/2006">
-    <mc:Choice xmlns:p159="http://schemas.microsoft.com/office/powerpoint/2015/09/main" Requires="p159">
+  <mc:AlternateContent xmlns:mc="http://schemas.openxmlformats.org/markup-compatibility/2006" xmlns:p159="http://schemas.microsoft.com/office/powerpoint/2015/09/main">
+    <mc:Choice Requires="p159">
       <p:transition xmlns:p14="http://schemas.microsoft.com/office/powerpoint/2010/main" spd="slow" p14:dur="2000">
         <p159:morph option="byObject"/>
       </p:transition>
     </mc:Choice>
-    <mc:Fallback>
+    <mc:Fallback xmlns="">
       <p:transition spd="slow">
         <p:fade/>
       </p:transition>
@@ -3523,13 +3532,13 @@
   <p:clrMapOvr>
     <a:masterClrMapping/>
   </p:clrMapOvr>
-  <mc:AlternateContent xmlns:mc="http://schemas.openxmlformats.org/markup-compatibility/2006">
-    <mc:Choice xmlns:p159="http://schemas.microsoft.com/office/powerpoint/2015/09/main" Requires="p159">
+  <mc:AlternateContent xmlns:mc="http://schemas.openxmlformats.org/markup-compatibility/2006" xmlns:p159="http://schemas.microsoft.com/office/powerpoint/2015/09/main">
+    <mc:Choice Requires="p159">
       <p:transition xmlns:p14="http://schemas.microsoft.com/office/powerpoint/2010/main" spd="slow" p14:dur="2000">
         <p159:morph option="byObject"/>
       </p:transition>
     </mc:Choice>
-    <mc:Fallback>
+    <mc:Fallback xmlns="">
       <p:transition spd="slow">
         <p:fade/>
       </p:transition>
@@ -3922,13 +3931,13 @@
     <p:sldLayoutId id="2147483906" r:id="rId10"/>
     <p:sldLayoutId id="2147483907" r:id="rId11"/>
   </p:sldLayoutIdLst>
-  <mc:AlternateContent xmlns:mc="http://schemas.openxmlformats.org/markup-compatibility/2006">
-    <mc:Choice xmlns:p159="http://schemas.microsoft.com/office/powerpoint/2015/09/main" Requires="p159">
+  <mc:AlternateContent xmlns:mc="http://schemas.openxmlformats.org/markup-compatibility/2006" xmlns:p159="http://schemas.microsoft.com/office/powerpoint/2015/09/main">
+    <mc:Choice Requires="p159">
       <p:transition xmlns:p14="http://schemas.microsoft.com/office/powerpoint/2010/main" spd="slow" p14:dur="2000">
         <p159:morph option="byObject"/>
       </p:transition>
     </mc:Choice>
-    <mc:Fallback>
+    <mc:Fallback xmlns="">
       <p:transition spd="slow">
         <p:fade/>
       </p:transition>
@@ -4576,13 +4585,262 @@
   <p:clrMapOvr>
     <a:masterClrMapping/>
   </p:clrMapOvr>
-  <mc:AlternateContent xmlns:mc="http://schemas.openxmlformats.org/markup-compatibility/2006">
-    <mc:Choice xmlns:p159="http://schemas.microsoft.com/office/powerpoint/2015/09/main" Requires="p159">
+  <mc:AlternateContent xmlns:mc="http://schemas.openxmlformats.org/markup-compatibility/2006" xmlns:p159="http://schemas.microsoft.com/office/powerpoint/2015/09/main">
+    <mc:Choice Requires="p159">
       <p:transition xmlns:p14="http://schemas.microsoft.com/office/powerpoint/2010/main" spd="slow" p14:dur="2000">
         <p159:morph option="byObject"/>
       </p:transition>
     </mc:Choice>
-    <mc:Fallback>
+    <mc:Fallback xmlns="">
+      <p:transition spd="slow">
+        <p:fade/>
+      </p:transition>
+    </mc:Fallback>
+  </mc:AlternateContent>
+</p:sld>
+</file>
+
+<file path=ppt/slides/slide10.xml><?xml version="1.0" encoding="utf-8"?>
+<p:sld xmlns:a="http://schemas.openxmlformats.org/drawingml/2006/main" xmlns:r="http://schemas.openxmlformats.org/officeDocument/2006/relationships" xmlns:p="http://schemas.openxmlformats.org/presentationml/2006/main" showMasterSp="0">
+  <p:cSld>
+    <p:spTree>
+      <p:nvGrpSpPr>
+        <p:cNvPr id="1" name=""/>
+        <p:cNvGrpSpPr/>
+        <p:nvPr/>
+      </p:nvGrpSpPr>
+      <p:grpSpPr>
+        <a:xfrm>
+          <a:off x="0" y="0"/>
+          <a:ext cx="0" cy="0"/>
+          <a:chOff x="0" y="0"/>
+          <a:chExt cx="0" cy="0"/>
+        </a:xfrm>
+      </p:grpSpPr>
+      <p:sp useBgFill="1">
+        <p:nvSpPr>
+          <p:cNvPr id="7" name="Rectangle 6">
+            <a:extLst>
+              <a:ext uri="{FF2B5EF4-FFF2-40B4-BE49-F238E27FC236}">
+                <a16:creationId xmlns:a16="http://schemas.microsoft.com/office/drawing/2014/main" id="{FBDCECDC-EEE3-4128-AA5E-82A8C08796E8}"/>
+              </a:ext>
+              <a:ext uri="{C183D7F6-B498-43B3-948B-1728B52AA6E4}">
+                <adec:decorative xmlns:adec="http://schemas.microsoft.com/office/drawing/2017/decorative" val="1"/>
+              </a:ext>
+            </a:extLst>
+          </p:cNvPr>
+          <p:cNvSpPr>
+            <a:spLocks noGrp="1" noRot="1" noChangeAspect="1" noMove="1" noResize="1" noEditPoints="1" noAdjustHandles="1" noChangeArrowheads="1" noChangeShapeType="1" noTextEdit="1"/>
+          </p:cNvSpPr>
+          <p:nvPr>
+            <p:extLst>
+              <p:ext uri="{386F3935-93C4-4BCD-93E2-E3B085C9AB24}">
+                <p16:designElem xmlns:p16="http://schemas.microsoft.com/office/powerpoint/2015/main" val="1"/>
+              </p:ext>
+            </p:extLst>
+          </p:nvPr>
+        </p:nvSpPr>
+        <p:spPr>
+          <a:xfrm>
+            <a:off x="1507" y="0"/>
+            <a:ext cx="12192000" cy="6858000"/>
+          </a:xfrm>
+          <a:prstGeom prst="rect">
+            <a:avLst/>
+          </a:prstGeom>
+          <a:ln>
+            <a:noFill/>
+          </a:ln>
+        </p:spPr>
+        <p:style>
+          <a:lnRef idx="2">
+            <a:schemeClr val="accent1">
+              <a:shade val="50000"/>
+            </a:schemeClr>
+          </a:lnRef>
+          <a:fillRef idx="1">
+            <a:schemeClr val="accent1"/>
+          </a:fillRef>
+          <a:effectRef idx="0">
+            <a:schemeClr val="accent1"/>
+          </a:effectRef>
+          <a:fontRef idx="minor">
+            <a:schemeClr val="lt1"/>
+          </a:fontRef>
+        </p:style>
+        <p:txBody>
+          <a:bodyPr rtlCol="0" anchor="ctr"/>
+          <a:lstStyle/>
+          <a:p>
+            <a:pPr algn="ctr"/>
+            <a:endParaRPr lang="en-US"/>
+          </a:p>
+        </p:txBody>
+      </p:sp>
+      <p:sp>
+        <p:nvSpPr>
+          <p:cNvPr id="2" name="Titolo 1">
+            <a:extLst>
+              <a:ext uri="{FF2B5EF4-FFF2-40B4-BE49-F238E27FC236}">
+                <a16:creationId xmlns:a16="http://schemas.microsoft.com/office/drawing/2014/main" id="{8056DD28-CECF-45BC-B901-3DB8B25803DD}"/>
+              </a:ext>
+            </a:extLst>
+          </p:cNvPr>
+          <p:cNvSpPr>
+            <a:spLocks noGrp="1"/>
+          </p:cNvSpPr>
+          <p:nvPr>
+            <p:ph type="ctrTitle"/>
+          </p:nvPr>
+        </p:nvSpPr>
+        <p:spPr>
+          <a:xfrm>
+            <a:off x="1097280" y="758952"/>
+            <a:ext cx="10058400" cy="3892168"/>
+          </a:xfrm>
+        </p:spPr>
+        <p:txBody>
+          <a:bodyPr>
+            <a:normAutofit/>
+          </a:bodyPr>
+          <a:lstStyle/>
+          <a:p>
+            <a:r>
+              <a:rPr lang="en-GB" sz="8000">
+                <a:latin typeface="Raleway Medium" panose="020B0603030101060003" pitchFamily="34" charset="0"/>
+              </a:rPr>
+              <a:t>Thank you!</a:t>
+            </a:r>
+          </a:p>
+        </p:txBody>
+      </p:sp>
+      <p:sp>
+        <p:nvSpPr>
+          <p:cNvPr id="9" name="Rectangle 8">
+            <a:extLst>
+              <a:ext uri="{FF2B5EF4-FFF2-40B4-BE49-F238E27FC236}">
+                <a16:creationId xmlns:a16="http://schemas.microsoft.com/office/drawing/2014/main" id="{4260EDE0-989C-4E16-AF94-F652294D828E}"/>
+              </a:ext>
+              <a:ext uri="{C183D7F6-B498-43B3-948B-1728B52AA6E4}">
+                <adec:decorative xmlns:adec="http://schemas.microsoft.com/office/drawing/2017/decorative" val="1"/>
+              </a:ext>
+            </a:extLst>
+          </p:cNvPr>
+          <p:cNvSpPr>
+            <a:spLocks noGrp="1" noRot="1" noChangeAspect="1" noMove="1" noResize="1" noEditPoints="1" noAdjustHandles="1" noChangeArrowheads="1" noChangeShapeType="1" noTextEdit="1"/>
+          </p:cNvSpPr>
+          <p:nvPr>
+            <p:extLst>
+              <p:ext uri="{386F3935-93C4-4BCD-93E2-E3B085C9AB24}">
+                <p16:designElem xmlns:p16="http://schemas.microsoft.com/office/powerpoint/2015/main" val="1"/>
+              </p:ext>
+            </p:extLst>
+          </p:nvPr>
+        </p:nvSpPr>
+        <p:spPr bwMode="white">
+          <a:xfrm>
+            <a:off x="1507" y="4953000"/>
+            <a:ext cx="12188952" cy="1905000"/>
+          </a:xfrm>
+          <a:prstGeom prst="rect">
+            <a:avLst/>
+          </a:prstGeom>
+          <a:solidFill>
+            <a:schemeClr val="accent2"/>
+          </a:solidFill>
+          <a:ln>
+            <a:noFill/>
+          </a:ln>
+        </p:spPr>
+        <p:style>
+          <a:lnRef idx="2">
+            <a:schemeClr val="accent1">
+              <a:shade val="50000"/>
+            </a:schemeClr>
+          </a:lnRef>
+          <a:fillRef idx="1">
+            <a:schemeClr val="accent1"/>
+          </a:fillRef>
+          <a:effectRef idx="0">
+            <a:schemeClr val="accent1"/>
+          </a:effectRef>
+          <a:fontRef idx="minor">
+            <a:schemeClr val="lt1"/>
+          </a:fontRef>
+        </p:style>
+      </p:sp>
+      <p:sp>
+        <p:nvSpPr>
+          <p:cNvPr id="11" name="Rectangle 10">
+            <a:extLst>
+              <a:ext uri="{FF2B5EF4-FFF2-40B4-BE49-F238E27FC236}">
+                <a16:creationId xmlns:a16="http://schemas.microsoft.com/office/drawing/2014/main" id="{1F3985C0-E548-44D2-B30E-F3E42DADE133}"/>
+              </a:ext>
+              <a:ext uri="{C183D7F6-B498-43B3-948B-1728B52AA6E4}">
+                <adec:decorative xmlns:adec="http://schemas.microsoft.com/office/drawing/2017/decorative" val="1"/>
+              </a:ext>
+            </a:extLst>
+          </p:cNvPr>
+          <p:cNvSpPr>
+            <a:spLocks noGrp="1" noRot="1" noChangeAspect="1" noMove="1" noResize="1" noEditPoints="1" noAdjustHandles="1" noChangeArrowheads="1" noChangeShapeType="1" noTextEdit="1"/>
+          </p:cNvSpPr>
+          <p:nvPr>
+            <p:extLst>
+              <p:ext uri="{386F3935-93C4-4BCD-93E2-E3B085C9AB24}">
+                <p16:designElem xmlns:p16="http://schemas.microsoft.com/office/powerpoint/2015/main" val="1"/>
+              </p:ext>
+            </p:extLst>
+          </p:nvPr>
+        </p:nvSpPr>
+        <p:spPr>
+          <a:xfrm>
+            <a:off x="1507" y="4906176"/>
+            <a:ext cx="12188952" cy="64008"/>
+          </a:xfrm>
+          <a:prstGeom prst="rect">
+            <a:avLst/>
+          </a:prstGeom>
+          <a:solidFill>
+            <a:schemeClr val="accent1"/>
+          </a:solidFill>
+          <a:ln>
+            <a:noFill/>
+          </a:ln>
+        </p:spPr>
+        <p:style>
+          <a:lnRef idx="2">
+            <a:schemeClr val="accent1">
+              <a:shade val="50000"/>
+            </a:schemeClr>
+          </a:lnRef>
+          <a:fillRef idx="1">
+            <a:schemeClr val="accent1"/>
+          </a:fillRef>
+          <a:effectRef idx="0">
+            <a:schemeClr val="accent1"/>
+          </a:effectRef>
+          <a:fontRef idx="minor">
+            <a:schemeClr val="lt1"/>
+          </a:fontRef>
+        </p:style>
+      </p:sp>
+    </p:spTree>
+    <p:extLst>
+      <p:ext uri="{BB962C8B-B14F-4D97-AF65-F5344CB8AC3E}">
+        <p14:creationId xmlns:p14="http://schemas.microsoft.com/office/powerpoint/2010/main" val="242059548"/>
+      </p:ext>
+    </p:extLst>
+  </p:cSld>
+  <p:clrMapOvr>
+    <a:masterClrMapping/>
+  </p:clrMapOvr>
+  <mc:AlternateContent xmlns:mc="http://schemas.openxmlformats.org/markup-compatibility/2006" xmlns:p159="http://schemas.microsoft.com/office/powerpoint/2015/09/main">
+    <mc:Choice Requires="p159">
+      <p:transition xmlns:p14="http://schemas.microsoft.com/office/powerpoint/2010/main" spd="slow" p14:dur="2000">
+        <p159:morph option="byObject"/>
+      </p:transition>
+    </mc:Choice>
+    <mc:Fallback xmlns="">
       <p:transition spd="slow">
         <p:fade/>
       </p:transition>
@@ -4693,13 +4951,13 @@
   <p:clrMapOvr>
     <a:masterClrMapping/>
   </p:clrMapOvr>
-  <mc:AlternateContent xmlns:mc="http://schemas.openxmlformats.org/markup-compatibility/2006">
-    <mc:Choice xmlns:p159="http://schemas.microsoft.com/office/powerpoint/2015/09/main" Requires="p159">
+  <mc:AlternateContent xmlns:mc="http://schemas.openxmlformats.org/markup-compatibility/2006" xmlns:p159="http://schemas.microsoft.com/office/powerpoint/2015/09/main">
+    <mc:Choice Requires="p159">
       <p:transition xmlns:p14="http://schemas.microsoft.com/office/powerpoint/2010/main" spd="slow" p14:dur="2000">
         <p159:morph option="byObject"/>
       </p:transition>
     </mc:Choice>
-    <mc:Fallback>
+    <mc:Fallback xmlns="">
       <p:transition spd="slow">
         <p:fade/>
       </p:transition>
@@ -4899,7 +5157,9 @@
           <a:lstStyle/>
           <a:p>
             <a:r>
-              <a:rPr lang="it-IT" dirty="0"/>
+              <a:rPr lang="it-IT" dirty="0">
+                <a:latin typeface="Raleway Medium" panose="020B0603030101060003" pitchFamily="34" charset="0"/>
+              </a:rPr>
               <a:t>Tasks</a:t>
             </a:r>
           </a:p>
@@ -5002,13 +5262,13 @@
   <p:clrMapOvr>
     <a:masterClrMapping/>
   </p:clrMapOvr>
-  <mc:AlternateContent xmlns:mc="http://schemas.openxmlformats.org/markup-compatibility/2006">
-    <mc:Choice xmlns:p159="http://schemas.microsoft.com/office/powerpoint/2015/09/main" Requires="p159">
+  <mc:AlternateContent xmlns:mc="http://schemas.openxmlformats.org/markup-compatibility/2006" xmlns:p159="http://schemas.microsoft.com/office/powerpoint/2015/09/main">
+    <mc:Choice Requires="p159">
       <p:transition xmlns:p14="http://schemas.microsoft.com/office/powerpoint/2010/main" spd="slow" p14:dur="2000">
         <p159:morph option="byObject"/>
       </p:transition>
     </mc:Choice>
-    <mc:Fallback>
+    <mc:Fallback xmlns="">
       <p:transition spd="slow">
         <p:fade/>
       </p:transition>
@@ -5337,7 +5597,9 @@
           <a:lstStyle/>
           <a:p>
             <a:r>
-              <a:rPr lang="en-GB" dirty="0"/>
+              <a:rPr lang="en-GB" dirty="0">
+                <a:latin typeface="Raleway Medium" panose="020B0603030101060003" pitchFamily="34" charset="0"/>
+              </a:rPr>
               <a:t>Estimations and errors</a:t>
             </a:r>
           </a:p>
@@ -5398,13 +5660,13 @@
   <p:clrMapOvr>
     <a:masterClrMapping/>
   </p:clrMapOvr>
-  <mc:AlternateContent xmlns:mc="http://schemas.openxmlformats.org/markup-compatibility/2006">
-    <mc:Choice xmlns:p159="http://schemas.microsoft.com/office/powerpoint/2015/09/main" Requires="p159">
+  <mc:AlternateContent xmlns:mc="http://schemas.openxmlformats.org/markup-compatibility/2006" xmlns:p159="http://schemas.microsoft.com/office/powerpoint/2015/09/main">
+    <mc:Choice Requires="p159">
       <p:transition xmlns:p14="http://schemas.microsoft.com/office/powerpoint/2010/main" spd="slow" p14:dur="2000">
         <p159:morph option="byObject"/>
       </p:transition>
     </mc:Choice>
-    <mc:Fallback>
+    <mc:Fallback xmlns="">
       <p:transition spd="slow">
         <p:fade/>
       </p:transition>
@@ -5732,15 +5994,11 @@
     <a:masterClrMapping/>
   </p:clrMapOvr>
   <mc:AlternateContent xmlns:mc="http://schemas.openxmlformats.org/markup-compatibility/2006">
-    <mc:Choice xmlns:p159="http://schemas.microsoft.com/office/powerpoint/2015/09/main" Requires="p159">
-      <p:transition xmlns:p14="http://schemas.microsoft.com/office/powerpoint/2010/main" spd="slow" p14:dur="2000">
-        <p159:morph option="byObject"/>
-      </p:transition>
+    <mc:Choice xmlns:p14="http://schemas.microsoft.com/office/powerpoint/2010/main" Requires="p14">
+      <p:transition p14:dur="0"/>
     </mc:Choice>
     <mc:Fallback>
-      <p:transition spd="slow">
-        <p:fade/>
-      </p:transition>
+      <p:transition/>
     </mc:Fallback>
   </mc:AlternateContent>
   <p:timing>
@@ -6026,6 +6284,225 @@
               <a:rPr lang="en-GB" dirty="0">
                 <a:latin typeface="Raleway Medium" panose="020B0603030101060003" pitchFamily="34" charset="0"/>
               </a:rPr>
+              <a:t>Stories and estimations: points</a:t>
+            </a:r>
+          </a:p>
+        </p:txBody>
+      </p:sp>
+      <p:sp>
+        <p:nvSpPr>
+          <p:cNvPr id="3" name="Segnaposto contenuto 2">
+            <a:extLst>
+              <a:ext uri="{FF2B5EF4-FFF2-40B4-BE49-F238E27FC236}">
+                <a16:creationId xmlns:a16="http://schemas.microsoft.com/office/drawing/2014/main" id="{31E2DDF8-771B-4271-93A7-58E7BF1D067C}"/>
+              </a:ext>
+            </a:extLst>
+          </p:cNvPr>
+          <p:cNvSpPr>
+            <a:spLocks noGrp="1"/>
+          </p:cNvSpPr>
+          <p:nvPr>
+            <p:ph idx="1"/>
+          </p:nvPr>
+        </p:nvSpPr>
+        <p:spPr>
+          <a:xfrm>
+            <a:off x="1097279" y="1845734"/>
+            <a:ext cx="10212872" cy="4023360"/>
+          </a:xfrm>
+        </p:spPr>
+        <p:txBody>
+          <a:bodyPr>
+            <a:normAutofit/>
+          </a:bodyPr>
+          <a:lstStyle/>
+          <a:p>
+            <a:endParaRPr lang="en-GB" sz="900" dirty="0">
+              <a:latin typeface="Raleway Medium" panose="020B0603030101060003" pitchFamily="34" charset="0"/>
+            </a:endParaRPr>
+          </a:p>
+          <a:p>
+            <a:r>
+              <a:rPr lang="en-GB" sz="2600" dirty="0">
+                <a:latin typeface="Raleway Medium" panose="020B0603030101060003" pitchFamily="34" charset="0"/>
+              </a:rPr>
+              <a:t>In the end, what we found out is that 1 point is equal to </a:t>
+            </a:r>
+            <a:br>
+              <a:rPr lang="en-GB" sz="2600" dirty="0">
+                <a:latin typeface="Raleway Medium" panose="020B0603030101060003" pitchFamily="34" charset="0"/>
+              </a:rPr>
+            </a:br>
+            <a:r>
+              <a:rPr lang="en-GB" sz="2600" dirty="0">
+                <a:latin typeface="Raleway Medium" panose="020B0603030101060003" pitchFamily="34" charset="0"/>
+              </a:rPr>
+              <a:t>38/18 ~= 2 hours.</a:t>
+            </a:r>
+          </a:p>
+        </p:txBody>
+      </p:sp>
+    </p:spTree>
+    <p:extLst>
+      <p:ext uri="{BB962C8B-B14F-4D97-AF65-F5344CB8AC3E}">
+        <p14:creationId xmlns:p14="http://schemas.microsoft.com/office/powerpoint/2010/main" val="1752789618"/>
+      </p:ext>
+    </p:extLst>
+  </p:cSld>
+  <p:clrMapOvr>
+    <a:masterClrMapping/>
+  </p:clrMapOvr>
+  <mc:AlternateContent xmlns:mc="http://schemas.openxmlformats.org/markup-compatibility/2006" xmlns:p159="http://schemas.microsoft.com/office/powerpoint/2015/09/main">
+    <mc:Choice Requires="p159">
+      <p:transition xmlns:p14="http://schemas.microsoft.com/office/powerpoint/2010/main" spd="slow" p14:dur="2000">
+        <p159:morph option="byObject"/>
+      </p:transition>
+    </mc:Choice>
+    <mc:Fallback xmlns="">
+      <p:transition spd="slow">
+        <p:fade/>
+      </p:transition>
+    </mc:Fallback>
+  </mc:AlternateContent>
+  <p:timing>
+    <p:tnLst>
+      <p:par>
+        <p:cTn id="1" dur="indefinite" restart="never" nodeType="tmRoot">
+          <p:childTnLst>
+            <p:seq concurrent="1" nextAc="seek">
+              <p:cTn id="2" dur="indefinite" nodeType="mainSeq">
+                <p:childTnLst>
+                  <p:par>
+                    <p:cTn id="3" fill="hold">
+                      <p:stCondLst>
+                        <p:cond delay="indefinite"/>
+                        <p:cond evt="onBegin" delay="0">
+                          <p:tn val="2"/>
+                        </p:cond>
+                      </p:stCondLst>
+                      <p:childTnLst>
+                        <p:par>
+                          <p:cTn id="4" fill="hold">
+                            <p:stCondLst>
+                              <p:cond delay="0"/>
+                            </p:stCondLst>
+                            <p:childTnLst>
+                              <p:par>
+                                <p:cTn id="5" presetID="10" presetClass="entr" presetSubtype="0" fill="hold" nodeType="withEffect">
+                                  <p:stCondLst>
+                                    <p:cond delay="0"/>
+                                  </p:stCondLst>
+                                  <p:childTnLst>
+                                    <p:set>
+                                      <p:cBhvr>
+                                        <p:cTn id="6" dur="1" fill="hold">
+                                          <p:stCondLst>
+                                            <p:cond delay="0"/>
+                                          </p:stCondLst>
+                                        </p:cTn>
+                                        <p:tgtEl>
+                                          <p:spTgt spid="3">
+                                            <p:txEl>
+                                              <p:pRg st="1" end="1"/>
+                                            </p:txEl>
+                                          </p:spTgt>
+                                        </p:tgtEl>
+                                        <p:attrNameLst>
+                                          <p:attrName>style.visibility</p:attrName>
+                                        </p:attrNameLst>
+                                      </p:cBhvr>
+                                      <p:to>
+                                        <p:strVal val="visible"/>
+                                      </p:to>
+                                    </p:set>
+                                    <p:animEffect transition="in" filter="fade">
+                                      <p:cBhvr>
+                                        <p:cTn id="7" dur="500"/>
+                                        <p:tgtEl>
+                                          <p:spTgt spid="3">
+                                            <p:txEl>
+                                              <p:pRg st="1" end="1"/>
+                                            </p:txEl>
+                                          </p:spTgt>
+                                        </p:tgtEl>
+                                      </p:cBhvr>
+                                    </p:animEffect>
+                                  </p:childTnLst>
+                                </p:cTn>
+                              </p:par>
+                            </p:childTnLst>
+                          </p:cTn>
+                        </p:par>
+                      </p:childTnLst>
+                    </p:cTn>
+                  </p:par>
+                </p:childTnLst>
+              </p:cTn>
+              <p:prevCondLst>
+                <p:cond evt="onPrev" delay="0">
+                  <p:tgtEl>
+                    <p:sldTgt/>
+                  </p:tgtEl>
+                </p:cond>
+              </p:prevCondLst>
+              <p:nextCondLst>
+                <p:cond evt="onNext" delay="0">
+                  <p:tgtEl>
+                    <p:sldTgt/>
+                  </p:tgtEl>
+                </p:cond>
+              </p:nextCondLst>
+            </p:seq>
+          </p:childTnLst>
+        </p:cTn>
+      </p:par>
+    </p:tnLst>
+  </p:timing>
+</p:sld>
+</file>
+
+<file path=ppt/slides/slide7.xml><?xml version="1.0" encoding="utf-8"?>
+<p:sld xmlns:a="http://schemas.openxmlformats.org/drawingml/2006/main" xmlns:r="http://schemas.openxmlformats.org/officeDocument/2006/relationships" xmlns:p="http://schemas.openxmlformats.org/presentationml/2006/main">
+  <p:cSld>
+    <p:spTree>
+      <p:nvGrpSpPr>
+        <p:cNvPr id="1" name=""/>
+        <p:cNvGrpSpPr/>
+        <p:nvPr/>
+      </p:nvGrpSpPr>
+      <p:grpSpPr>
+        <a:xfrm>
+          <a:off x="0" y="0"/>
+          <a:ext cx="0" cy="0"/>
+          <a:chOff x="0" y="0"/>
+          <a:chExt cx="0" cy="0"/>
+        </a:xfrm>
+      </p:grpSpPr>
+      <p:sp>
+        <p:nvSpPr>
+          <p:cNvPr id="2" name="Titolo 1">
+            <a:extLst>
+              <a:ext uri="{FF2B5EF4-FFF2-40B4-BE49-F238E27FC236}">
+                <a16:creationId xmlns:a16="http://schemas.microsoft.com/office/drawing/2014/main" id="{53DB23E3-D320-4E6C-B083-2824D76B48DB}"/>
+              </a:ext>
+            </a:extLst>
+          </p:cNvPr>
+          <p:cNvSpPr>
+            <a:spLocks noGrp="1"/>
+          </p:cNvSpPr>
+          <p:nvPr>
+            <p:ph type="title"/>
+          </p:nvPr>
+        </p:nvSpPr>
+        <p:spPr/>
+        <p:txBody>
+          <a:bodyPr/>
+          <a:lstStyle/>
+          <a:p>
+            <a:r>
+              <a:rPr lang="en-GB" dirty="0">
+                <a:latin typeface="Raleway Medium" panose="020B0603030101060003" pitchFamily="34" charset="0"/>
+              </a:rPr>
               <a:t>Stories and estimations: time</a:t>
             </a:r>
           </a:p>
@@ -6086,13 +6563,13 @@
   <p:clrMapOvr>
     <a:masterClrMapping/>
   </p:clrMapOvr>
-  <mc:AlternateContent xmlns:mc="http://schemas.openxmlformats.org/markup-compatibility/2006">
-    <mc:Choice xmlns:p159="http://schemas.microsoft.com/office/powerpoint/2015/09/main" Requires="p159">
+  <mc:AlternateContent xmlns:mc="http://schemas.openxmlformats.org/markup-compatibility/2006" xmlns:p159="http://schemas.microsoft.com/office/powerpoint/2015/09/main">
+    <mc:Choice Requires="p159">
       <p:transition xmlns:p14="http://schemas.microsoft.com/office/powerpoint/2010/main" spd="slow" p14:dur="2000">
         <p159:morph option="byObject"/>
       </p:transition>
     </mc:Choice>
-    <mc:Fallback>
+    <mc:Fallback xmlns="">
       <p:transition spd="slow">
         <p:fade/>
       </p:transition>
@@ -6253,356 +6730,6 @@
 </p:sld>
 </file>
 
-<file path=ppt/slides/slide7.xml><?xml version="1.0" encoding="utf-8"?>
-<p:sld xmlns:a="http://schemas.openxmlformats.org/drawingml/2006/main" xmlns:r="http://schemas.openxmlformats.org/officeDocument/2006/relationships" xmlns:p="http://schemas.openxmlformats.org/presentationml/2006/main">
-  <p:cSld>
-    <p:spTree>
-      <p:nvGrpSpPr>
-        <p:cNvPr id="1" name=""/>
-        <p:cNvGrpSpPr/>
-        <p:nvPr/>
-      </p:nvGrpSpPr>
-      <p:grpSpPr>
-        <a:xfrm>
-          <a:off x="0" y="0"/>
-          <a:ext cx="0" cy="0"/>
-          <a:chOff x="0" y="0"/>
-          <a:chExt cx="0" cy="0"/>
-        </a:xfrm>
-      </p:grpSpPr>
-      <p:sp>
-        <p:nvSpPr>
-          <p:cNvPr id="2" name="Titolo 1">
-            <a:extLst>
-              <a:ext uri="{FF2B5EF4-FFF2-40B4-BE49-F238E27FC236}">
-                <a16:creationId xmlns:a16="http://schemas.microsoft.com/office/drawing/2014/main" id="{53DB23E3-D320-4E6C-B083-2824D76B48DB}"/>
-              </a:ext>
-            </a:extLst>
-          </p:cNvPr>
-          <p:cNvSpPr>
-            <a:spLocks noGrp="1"/>
-          </p:cNvSpPr>
-          <p:nvPr>
-            <p:ph type="title"/>
-          </p:nvPr>
-        </p:nvSpPr>
-        <p:spPr/>
-        <p:txBody>
-          <a:bodyPr/>
-          <a:lstStyle/>
-          <a:p>
-            <a:r>
-              <a:rPr lang="en-GB" dirty="0">
-                <a:latin typeface="Raleway Medium" panose="020B0603030101060003" pitchFamily="34" charset="0"/>
-              </a:rPr>
-              <a:t>What we learned</a:t>
-            </a:r>
-          </a:p>
-        </p:txBody>
-      </p:sp>
-      <p:sp>
-        <p:nvSpPr>
-          <p:cNvPr id="3" name="Segnaposto contenuto 2">
-            <a:extLst>
-              <a:ext uri="{FF2B5EF4-FFF2-40B4-BE49-F238E27FC236}">
-                <a16:creationId xmlns:a16="http://schemas.microsoft.com/office/drawing/2014/main" id="{31E2DDF8-771B-4271-93A7-58E7BF1D067C}"/>
-              </a:ext>
-            </a:extLst>
-          </p:cNvPr>
-          <p:cNvSpPr>
-            <a:spLocks noGrp="1"/>
-          </p:cNvSpPr>
-          <p:nvPr>
-            <p:ph idx="1"/>
-          </p:nvPr>
-        </p:nvSpPr>
-        <p:spPr/>
-        <p:txBody>
-          <a:bodyPr>
-            <a:normAutofit/>
-          </a:bodyPr>
-          <a:lstStyle/>
-          <a:p>
-            <a:endParaRPr lang="it-IT" sz="900" dirty="0">
-              <a:latin typeface="Raleway Medium" panose="020B0603030101060003" pitchFamily="34" charset="0"/>
-            </a:endParaRPr>
-          </a:p>
-          <a:p>
-            <a:pPr>
-              <a:buFont typeface="Arial" panose="020B0604020202020204" pitchFamily="34" charset="0"/>
-              <a:buChar char="•"/>
-            </a:pPr>
-            <a:r>
-              <a:rPr lang="en-GB" sz="2600" dirty="0">
-                <a:latin typeface="Raleway Medium" panose="020B0603030101060003" pitchFamily="34" charset="0"/>
-              </a:rPr>
-              <a:t>Estimation is not easy, even with poker</a:t>
-            </a:r>
-          </a:p>
-          <a:p>
-            <a:pPr>
-              <a:buFont typeface="Arial" panose="020B0604020202020204" pitchFamily="34" charset="0"/>
-              <a:buChar char="•"/>
-            </a:pPr>
-            <a:r>
-              <a:rPr lang="en-GB" sz="2600" dirty="0">
-                <a:latin typeface="Raleway Medium" panose="020B0603030101060003" pitchFamily="34" charset="0"/>
-              </a:rPr>
-              <a:t>The team may have different visions from you, and many coding styles differ from each other because of this; also, because of this, the code should have meaningful variable names and comments.</a:t>
-            </a:r>
-          </a:p>
-          <a:p>
-            <a:pPr>
-              <a:buFont typeface="Arial" panose="020B0604020202020204" pitchFamily="34" charset="0"/>
-              <a:buChar char="•"/>
-            </a:pPr>
-            <a:r>
-              <a:rPr lang="en-GB" sz="2600" dirty="0">
-                <a:latin typeface="Raleway Medium" panose="020B0603030101060003" pitchFamily="34" charset="0"/>
-              </a:rPr>
-              <a:t>We should have divided our tasks better.</a:t>
-            </a:r>
-          </a:p>
-        </p:txBody>
-      </p:sp>
-    </p:spTree>
-    <p:extLst>
-      <p:ext uri="{BB962C8B-B14F-4D97-AF65-F5344CB8AC3E}">
-        <p14:creationId xmlns:p14="http://schemas.microsoft.com/office/powerpoint/2010/main" val="207683525"/>
-      </p:ext>
-    </p:extLst>
-  </p:cSld>
-  <p:clrMapOvr>
-    <a:masterClrMapping/>
-  </p:clrMapOvr>
-  <mc:AlternateContent xmlns:mc="http://schemas.openxmlformats.org/markup-compatibility/2006">
-    <mc:Choice xmlns:p159="http://schemas.microsoft.com/office/powerpoint/2015/09/main" Requires="p159">
-      <p:transition xmlns:p14="http://schemas.microsoft.com/office/powerpoint/2010/main" spd="slow" p14:dur="2000">
-        <p159:morph option="byObject"/>
-      </p:transition>
-    </mc:Choice>
-    <mc:Fallback>
-      <p:transition spd="slow">
-        <p:fade/>
-      </p:transition>
-    </mc:Fallback>
-  </mc:AlternateContent>
-  <p:timing>
-    <p:tnLst>
-      <p:par>
-        <p:cTn id="1" dur="indefinite" restart="never" nodeType="tmRoot">
-          <p:childTnLst>
-            <p:seq concurrent="1" nextAc="seek">
-              <p:cTn id="2" dur="indefinite" nodeType="mainSeq">
-                <p:childTnLst>
-                  <p:par>
-                    <p:cTn id="3" fill="hold">
-                      <p:stCondLst>
-                        <p:cond delay="indefinite"/>
-                      </p:stCondLst>
-                      <p:childTnLst>
-                        <p:par>
-                          <p:cTn id="4" fill="hold">
-                            <p:stCondLst>
-                              <p:cond delay="0"/>
-                            </p:stCondLst>
-                            <p:childTnLst>
-                              <p:par>
-                                <p:cTn id="5" presetID="10" presetClass="entr" presetSubtype="0" fill="hold" nodeType="clickEffect">
-                                  <p:stCondLst>
-                                    <p:cond delay="0"/>
-                                  </p:stCondLst>
-                                  <p:childTnLst>
-                                    <p:set>
-                                      <p:cBhvr>
-                                        <p:cTn id="6" dur="1" fill="hold">
-                                          <p:stCondLst>
-                                            <p:cond delay="0"/>
-                                          </p:stCondLst>
-                                        </p:cTn>
-                                        <p:tgtEl>
-                                          <p:spTgt spid="3">
-                                            <p:txEl>
-                                              <p:pRg st="1" end="1"/>
-                                            </p:txEl>
-                                          </p:spTgt>
-                                        </p:tgtEl>
-                                        <p:attrNameLst>
-                                          <p:attrName>style.visibility</p:attrName>
-                                        </p:attrNameLst>
-                                      </p:cBhvr>
-                                      <p:to>
-                                        <p:strVal val="visible"/>
-                                      </p:to>
-                                    </p:set>
-                                    <p:animEffect transition="in" filter="fade">
-                                      <p:cBhvr>
-                                        <p:cTn id="7" dur="500"/>
-                                        <p:tgtEl>
-                                          <p:spTgt spid="3">
-                                            <p:txEl>
-                                              <p:pRg st="1" end="1"/>
-                                            </p:txEl>
-                                          </p:spTgt>
-                                        </p:tgtEl>
-                                      </p:cBhvr>
-                                    </p:animEffect>
-                                  </p:childTnLst>
-                                </p:cTn>
-                              </p:par>
-                            </p:childTnLst>
-                          </p:cTn>
-                        </p:par>
-                      </p:childTnLst>
-                    </p:cTn>
-                  </p:par>
-                  <p:par>
-                    <p:cTn id="8" fill="hold">
-                      <p:stCondLst>
-                        <p:cond delay="indefinite"/>
-                      </p:stCondLst>
-                      <p:childTnLst>
-                        <p:par>
-                          <p:cTn id="9" fill="hold">
-                            <p:stCondLst>
-                              <p:cond delay="0"/>
-                            </p:stCondLst>
-                            <p:childTnLst>
-                              <p:par>
-                                <p:cTn id="10" presetID="10" presetClass="entr" presetSubtype="0" fill="hold" nodeType="clickEffect">
-                                  <p:stCondLst>
-                                    <p:cond delay="0"/>
-                                  </p:stCondLst>
-                                  <p:childTnLst>
-                                    <p:set>
-                                      <p:cBhvr>
-                                        <p:cTn id="11" dur="1" fill="hold">
-                                          <p:stCondLst>
-                                            <p:cond delay="0"/>
-                                          </p:stCondLst>
-                                        </p:cTn>
-                                        <p:tgtEl>
-                                          <p:spTgt spid="3">
-                                            <p:txEl>
-                                              <p:pRg st="2" end="2"/>
-                                            </p:txEl>
-                                          </p:spTgt>
-                                        </p:tgtEl>
-                                        <p:attrNameLst>
-                                          <p:attrName>style.visibility</p:attrName>
-                                        </p:attrNameLst>
-                                      </p:cBhvr>
-                                      <p:to>
-                                        <p:strVal val="visible"/>
-                                      </p:to>
-                                    </p:set>
-                                    <p:animEffect transition="in" filter="fade">
-                                      <p:cBhvr>
-                                        <p:cTn id="12" dur="500"/>
-                                        <p:tgtEl>
-                                          <p:spTgt spid="3">
-                                            <p:txEl>
-                                              <p:pRg st="2" end="2"/>
-                                            </p:txEl>
-                                          </p:spTgt>
-                                        </p:tgtEl>
-                                      </p:cBhvr>
-                                    </p:animEffect>
-                                  </p:childTnLst>
-                                </p:cTn>
-                              </p:par>
-                            </p:childTnLst>
-                          </p:cTn>
-                        </p:par>
-                      </p:childTnLst>
-                    </p:cTn>
-                  </p:par>
-                  <p:par>
-                    <p:cTn id="13" fill="hold">
-                      <p:stCondLst>
-                        <p:cond delay="indefinite"/>
-                      </p:stCondLst>
-                      <p:childTnLst>
-                        <p:par>
-                          <p:cTn id="14" fill="hold">
-                            <p:stCondLst>
-                              <p:cond delay="0"/>
-                            </p:stCondLst>
-                            <p:childTnLst>
-                              <p:par>
-                                <p:cTn id="15" presetID="10" presetClass="entr" presetSubtype="0" fill="hold" nodeType="clickEffect">
-                                  <p:stCondLst>
-                                    <p:cond delay="0"/>
-                                  </p:stCondLst>
-                                  <p:childTnLst>
-                                    <p:set>
-                                      <p:cBhvr>
-                                        <p:cTn id="16" dur="1" fill="hold">
-                                          <p:stCondLst>
-                                            <p:cond delay="0"/>
-                                          </p:stCondLst>
-                                        </p:cTn>
-                                        <p:tgtEl>
-                                          <p:spTgt spid="3">
-                                            <p:txEl>
-                                              <p:pRg st="3" end="3"/>
-                                            </p:txEl>
-                                          </p:spTgt>
-                                        </p:tgtEl>
-                                        <p:attrNameLst>
-                                          <p:attrName>style.visibility</p:attrName>
-                                        </p:attrNameLst>
-                                      </p:cBhvr>
-                                      <p:to>
-                                        <p:strVal val="visible"/>
-                                      </p:to>
-                                    </p:set>
-                                    <p:animEffect transition="in" filter="fade">
-                                      <p:cBhvr>
-                                        <p:cTn id="17" dur="500"/>
-                                        <p:tgtEl>
-                                          <p:spTgt spid="3">
-                                            <p:txEl>
-                                              <p:pRg st="3" end="3"/>
-                                            </p:txEl>
-                                          </p:spTgt>
-                                        </p:tgtEl>
-                                      </p:cBhvr>
-                                    </p:animEffect>
-                                  </p:childTnLst>
-                                </p:cTn>
-                              </p:par>
-                            </p:childTnLst>
-                          </p:cTn>
-                        </p:par>
-                      </p:childTnLst>
-                    </p:cTn>
-                  </p:par>
-                </p:childTnLst>
-              </p:cTn>
-              <p:prevCondLst>
-                <p:cond evt="onPrev" delay="0">
-                  <p:tgtEl>
-                    <p:sldTgt/>
-                  </p:tgtEl>
-                </p:cond>
-              </p:prevCondLst>
-              <p:nextCondLst>
-                <p:cond evt="onNext" delay="0">
-                  <p:tgtEl>
-                    <p:sldTgt/>
-                  </p:tgtEl>
-                </p:cond>
-              </p:nextCondLst>
-            </p:seq>
-          </p:childTnLst>
-        </p:cTn>
-      </p:par>
-    </p:tnLst>
-  </p:timing>
-</p:sld>
-</file>
-
 <file path=ppt/slides/slide8.xml><?xml version="1.0" encoding="utf-8"?>
 <p:sld xmlns:a="http://schemas.openxmlformats.org/drawingml/2006/main" xmlns:r="http://schemas.openxmlformats.org/officeDocument/2006/relationships" xmlns:p="http://schemas.openxmlformats.org/presentationml/2006/main">
   <p:cSld>
@@ -6645,7 +6772,7 @@
               <a:rPr lang="en-GB" dirty="0">
                 <a:latin typeface="Raleway Medium" panose="020B0603030101060003" pitchFamily="34" charset="0"/>
               </a:rPr>
-              <a:t>What we are proud of</a:t>
+              <a:t>What we learned</a:t>
             </a:r>
           </a:p>
         </p:txBody>
@@ -6686,7 +6813,7 @@
               <a:rPr lang="en-GB" sz="2600" dirty="0">
                 <a:latin typeface="Raleway Medium" panose="020B0603030101060003" pitchFamily="34" charset="0"/>
               </a:rPr>
-              <a:t>Buttons. They are big, Gertrude is happy.</a:t>
+              <a:t>Estimation is not easy, even with poker</a:t>
             </a:r>
           </a:p>
           <a:p>
@@ -6698,7 +6825,7 @@
               <a:rPr lang="en-GB" sz="2600" dirty="0">
                 <a:latin typeface="Raleway Medium" panose="020B0603030101060003" pitchFamily="34" charset="0"/>
               </a:rPr>
-              <a:t>Modularity: the code is really flexible and allows us even to use it in a rough way, sacrificing little performance to improve developing time</a:t>
+              <a:t>The team may have different visions from you, and many coding styles differ from each other because of this; also, because of this, the code should have meaningful variable names and comments.</a:t>
             </a:r>
           </a:p>
           <a:p>
@@ -6710,7 +6837,7 @@
               <a:rPr lang="en-GB" sz="2600" dirty="0">
                 <a:latin typeface="Raleway Medium" panose="020B0603030101060003" pitchFamily="34" charset="0"/>
               </a:rPr>
-              <a:t>An off-by-1 error that no one noticed.</a:t>
+              <a:t>We should have divided our tasks better.</a:t>
             </a:r>
           </a:p>
         </p:txBody>
@@ -6718,20 +6845,20 @@
     </p:spTree>
     <p:extLst>
       <p:ext uri="{BB962C8B-B14F-4D97-AF65-F5344CB8AC3E}">
-        <p14:creationId xmlns:p14="http://schemas.microsoft.com/office/powerpoint/2010/main" val="3909475892"/>
+        <p14:creationId xmlns:p14="http://schemas.microsoft.com/office/powerpoint/2010/main" val="207683525"/>
       </p:ext>
     </p:extLst>
   </p:cSld>
   <p:clrMapOvr>
     <a:masterClrMapping/>
   </p:clrMapOvr>
-  <mc:AlternateContent xmlns:mc="http://schemas.openxmlformats.org/markup-compatibility/2006">
-    <mc:Choice xmlns:p159="http://schemas.microsoft.com/office/powerpoint/2015/09/main" Requires="p159">
+  <mc:AlternateContent xmlns:mc="http://schemas.openxmlformats.org/markup-compatibility/2006" xmlns:p159="http://schemas.microsoft.com/office/powerpoint/2015/09/main">
+    <mc:Choice Requires="p159">
       <p:transition xmlns:p14="http://schemas.microsoft.com/office/powerpoint/2010/main" spd="slow" p14:dur="2000">
         <p159:morph option="byObject"/>
       </p:transition>
     </mc:Choice>
-    <mc:Fallback>
+    <mc:Fallback xmlns="">
       <p:transition spd="slow">
         <p:fade/>
       </p:transition>
@@ -6954,7 +7081,7 @@
 </file>
 
 <file path=ppt/slides/slide9.xml><?xml version="1.0" encoding="utf-8"?>
-<p:sld xmlns:a="http://schemas.openxmlformats.org/drawingml/2006/main" xmlns:r="http://schemas.openxmlformats.org/officeDocument/2006/relationships" xmlns:p="http://schemas.openxmlformats.org/presentationml/2006/main" showMasterSp="0">
+<p:sld xmlns:a="http://schemas.openxmlformats.org/drawingml/2006/main" xmlns:r="http://schemas.openxmlformats.org/officeDocument/2006/relationships" xmlns:p="http://schemas.openxmlformats.org/presentationml/2006/main">
   <p:cSld>
     <p:spTree>
       <p:nvGrpSpPr>
@@ -6970,72 +7097,42 @@
           <a:chExt cx="0" cy="0"/>
         </a:xfrm>
       </p:grpSpPr>
-      <p:sp useBgFill="1">
-        <p:nvSpPr>
-          <p:cNvPr id="7" name="Rectangle 6">
+      <p:sp>
+        <p:nvSpPr>
+          <p:cNvPr id="2" name="Titolo 1">
             <a:extLst>
               <a:ext uri="{FF2B5EF4-FFF2-40B4-BE49-F238E27FC236}">
-                <a16:creationId xmlns:a16="http://schemas.microsoft.com/office/drawing/2014/main" id="{FBDCECDC-EEE3-4128-AA5E-82A8C08796E8}"/>
-              </a:ext>
-              <a:ext uri="{C183D7F6-B498-43B3-948B-1728B52AA6E4}">
-                <adec:decorative xmlns:adec="http://schemas.microsoft.com/office/drawing/2017/decorative" val="1"/>
+                <a16:creationId xmlns:a16="http://schemas.microsoft.com/office/drawing/2014/main" id="{53DB23E3-D320-4E6C-B083-2824D76B48DB}"/>
               </a:ext>
             </a:extLst>
           </p:cNvPr>
           <p:cNvSpPr>
-            <a:spLocks noGrp="1" noRot="1" noChangeAspect="1" noMove="1" noResize="1" noEditPoints="1" noAdjustHandles="1" noChangeArrowheads="1" noChangeShapeType="1" noTextEdit="1"/>
-          </p:cNvSpPr>
-          <p:nvPr>
-            <p:extLst>
-              <p:ext uri="{386F3935-93C4-4BCD-93E2-E3B085C9AB24}">
-                <p16:designElem xmlns:p16="http://schemas.microsoft.com/office/powerpoint/2015/main" val="1"/>
-              </p:ext>
-            </p:extLst>
-          </p:nvPr>
-        </p:nvSpPr>
-        <p:spPr>
-          <a:xfrm>
-            <a:off x="1507" y="0"/>
-            <a:ext cx="12192000" cy="6858000"/>
-          </a:xfrm>
-          <a:prstGeom prst="rect">
-            <a:avLst/>
-          </a:prstGeom>
-          <a:ln>
-            <a:noFill/>
-          </a:ln>
-        </p:spPr>
-        <p:style>
-          <a:lnRef idx="2">
-            <a:schemeClr val="accent1">
-              <a:shade val="50000"/>
-            </a:schemeClr>
-          </a:lnRef>
-          <a:fillRef idx="1">
-            <a:schemeClr val="accent1"/>
-          </a:fillRef>
-          <a:effectRef idx="0">
-            <a:schemeClr val="accent1"/>
-          </a:effectRef>
-          <a:fontRef idx="minor">
-            <a:schemeClr val="lt1"/>
-          </a:fontRef>
-        </p:style>
-        <p:txBody>
-          <a:bodyPr rtlCol="0" anchor="ctr"/>
+            <a:spLocks noGrp="1"/>
+          </p:cNvSpPr>
+          <p:nvPr>
+            <p:ph type="title"/>
+          </p:nvPr>
+        </p:nvSpPr>
+        <p:spPr/>
+        <p:txBody>
+          <a:bodyPr/>
           <a:lstStyle/>
           <a:p>
-            <a:pPr algn="ctr"/>
-            <a:endParaRPr lang="en-US"/>
-          </a:p>
-        </p:txBody>
-      </p:sp>
-      <p:sp>
-        <p:nvSpPr>
-          <p:cNvPr id="2" name="Titolo 1">
+            <a:r>
+              <a:rPr lang="en-GB" dirty="0">
+                <a:latin typeface="Raleway Medium" panose="020B0603030101060003" pitchFamily="34" charset="0"/>
+              </a:rPr>
+              <a:t>What we are proud of</a:t>
+            </a:r>
+          </a:p>
+        </p:txBody>
+      </p:sp>
+      <p:sp>
+        <p:nvSpPr>
+          <p:cNvPr id="3" name="Segnaposto contenuto 2">
             <a:extLst>
               <a:ext uri="{FF2B5EF4-FFF2-40B4-BE49-F238E27FC236}">
-                <a16:creationId xmlns:a16="http://schemas.microsoft.com/office/drawing/2014/main" id="{8056DD28-CECF-45BC-B901-3DB8B25803DD}"/>
+                <a16:creationId xmlns:a16="http://schemas.microsoft.com/office/drawing/2014/main" id="{31E2DDF8-771B-4271-93A7-58E7BF1D067C}"/>
               </a:ext>
             </a:extLst>
           </p:cNvPr>
@@ -7043,162 +7140,293 @@
             <a:spLocks noGrp="1"/>
           </p:cNvSpPr>
           <p:nvPr>
-            <p:ph type="ctrTitle"/>
-          </p:nvPr>
-        </p:nvSpPr>
-        <p:spPr>
-          <a:xfrm>
-            <a:off x="1097280" y="758952"/>
-            <a:ext cx="10058400" cy="3892168"/>
-          </a:xfrm>
-        </p:spPr>
+            <p:ph idx="1"/>
+          </p:nvPr>
+        </p:nvSpPr>
+        <p:spPr/>
         <p:txBody>
           <a:bodyPr>
             <a:normAutofit/>
           </a:bodyPr>
           <a:lstStyle/>
           <a:p>
-            <a:r>
-              <a:rPr lang="en-GB" sz="8000">
+            <a:endParaRPr lang="it-IT" sz="900" dirty="0">
+              <a:latin typeface="Raleway Medium" panose="020B0603030101060003" pitchFamily="34" charset="0"/>
+            </a:endParaRPr>
+          </a:p>
+          <a:p>
+            <a:pPr>
+              <a:buFont typeface="Arial" panose="020B0604020202020204" pitchFamily="34" charset="0"/>
+              <a:buChar char="•"/>
+            </a:pPr>
+            <a:r>
+              <a:rPr lang="en-GB" sz="2600" dirty="0">
                 <a:latin typeface="Raleway Medium" panose="020B0603030101060003" pitchFamily="34" charset="0"/>
               </a:rPr>
-              <a:t>Thank you!</a:t>
-            </a:r>
-          </a:p>
-        </p:txBody>
-      </p:sp>
-      <p:sp>
-        <p:nvSpPr>
-          <p:cNvPr id="9" name="Rectangle 8">
-            <a:extLst>
-              <a:ext uri="{FF2B5EF4-FFF2-40B4-BE49-F238E27FC236}">
-                <a16:creationId xmlns:a16="http://schemas.microsoft.com/office/drawing/2014/main" id="{4260EDE0-989C-4E16-AF94-F652294D828E}"/>
-              </a:ext>
-              <a:ext uri="{C183D7F6-B498-43B3-948B-1728B52AA6E4}">
-                <adec:decorative xmlns:adec="http://schemas.microsoft.com/office/drawing/2017/decorative" val="1"/>
-              </a:ext>
-            </a:extLst>
-          </p:cNvPr>
-          <p:cNvSpPr>
-            <a:spLocks noGrp="1" noRot="1" noChangeAspect="1" noMove="1" noResize="1" noEditPoints="1" noAdjustHandles="1" noChangeArrowheads="1" noChangeShapeType="1" noTextEdit="1"/>
-          </p:cNvSpPr>
-          <p:nvPr>
-            <p:extLst>
-              <p:ext uri="{386F3935-93C4-4BCD-93E2-E3B085C9AB24}">
-                <p16:designElem xmlns:p16="http://schemas.microsoft.com/office/powerpoint/2015/main" val="1"/>
-              </p:ext>
-            </p:extLst>
-          </p:nvPr>
-        </p:nvSpPr>
-        <p:spPr bwMode="white">
-          <a:xfrm>
-            <a:off x="1507" y="4953000"/>
-            <a:ext cx="12188952" cy="1905000"/>
-          </a:xfrm>
-          <a:prstGeom prst="rect">
-            <a:avLst/>
-          </a:prstGeom>
-          <a:solidFill>
-            <a:schemeClr val="accent2"/>
-          </a:solidFill>
-          <a:ln>
-            <a:noFill/>
-          </a:ln>
-        </p:spPr>
-        <p:style>
-          <a:lnRef idx="2">
-            <a:schemeClr val="accent1">
-              <a:shade val="50000"/>
-            </a:schemeClr>
-          </a:lnRef>
-          <a:fillRef idx="1">
-            <a:schemeClr val="accent1"/>
-          </a:fillRef>
-          <a:effectRef idx="0">
-            <a:schemeClr val="accent1"/>
-          </a:effectRef>
-          <a:fontRef idx="minor">
-            <a:schemeClr val="lt1"/>
-          </a:fontRef>
-        </p:style>
-      </p:sp>
-      <p:sp>
-        <p:nvSpPr>
-          <p:cNvPr id="11" name="Rectangle 10">
-            <a:extLst>
-              <a:ext uri="{FF2B5EF4-FFF2-40B4-BE49-F238E27FC236}">
-                <a16:creationId xmlns:a16="http://schemas.microsoft.com/office/drawing/2014/main" id="{1F3985C0-E548-44D2-B30E-F3E42DADE133}"/>
-              </a:ext>
-              <a:ext uri="{C183D7F6-B498-43B3-948B-1728B52AA6E4}">
-                <adec:decorative xmlns:adec="http://schemas.microsoft.com/office/drawing/2017/decorative" val="1"/>
-              </a:ext>
-            </a:extLst>
-          </p:cNvPr>
-          <p:cNvSpPr>
-            <a:spLocks noGrp="1" noRot="1" noChangeAspect="1" noMove="1" noResize="1" noEditPoints="1" noAdjustHandles="1" noChangeArrowheads="1" noChangeShapeType="1" noTextEdit="1"/>
-          </p:cNvSpPr>
-          <p:nvPr>
-            <p:extLst>
-              <p:ext uri="{386F3935-93C4-4BCD-93E2-E3B085C9AB24}">
-                <p16:designElem xmlns:p16="http://schemas.microsoft.com/office/powerpoint/2015/main" val="1"/>
-              </p:ext>
-            </p:extLst>
-          </p:nvPr>
-        </p:nvSpPr>
-        <p:spPr>
-          <a:xfrm>
-            <a:off x="1507" y="4906176"/>
-            <a:ext cx="12188952" cy="64008"/>
-          </a:xfrm>
-          <a:prstGeom prst="rect">
-            <a:avLst/>
-          </a:prstGeom>
-          <a:solidFill>
-            <a:schemeClr val="accent1"/>
-          </a:solidFill>
-          <a:ln>
-            <a:noFill/>
-          </a:ln>
-        </p:spPr>
-        <p:style>
-          <a:lnRef idx="2">
-            <a:schemeClr val="accent1">
-              <a:shade val="50000"/>
-            </a:schemeClr>
-          </a:lnRef>
-          <a:fillRef idx="1">
-            <a:schemeClr val="accent1"/>
-          </a:fillRef>
-          <a:effectRef idx="0">
-            <a:schemeClr val="accent1"/>
-          </a:effectRef>
-          <a:fontRef idx="minor">
-            <a:schemeClr val="lt1"/>
-          </a:fontRef>
-        </p:style>
+              <a:t>Buttons. They are big, Gertrude is happy.</a:t>
+            </a:r>
+          </a:p>
+          <a:p>
+            <a:pPr>
+              <a:buFont typeface="Arial" panose="020B0604020202020204" pitchFamily="34" charset="0"/>
+              <a:buChar char="•"/>
+            </a:pPr>
+            <a:r>
+              <a:rPr lang="en-GB" sz="2600" dirty="0">
+                <a:latin typeface="Raleway Medium" panose="020B0603030101060003" pitchFamily="34" charset="0"/>
+              </a:rPr>
+              <a:t>Modularity: the code is really flexible and allows us even to use it in a rough way, sacrificing little performance to improve developing time</a:t>
+            </a:r>
+          </a:p>
+          <a:p>
+            <a:pPr>
+              <a:buFont typeface="Arial" panose="020B0604020202020204" pitchFamily="34" charset="0"/>
+              <a:buChar char="•"/>
+            </a:pPr>
+            <a:r>
+              <a:rPr lang="en-GB" sz="2600" dirty="0">
+                <a:latin typeface="Raleway Medium" panose="020B0603030101060003" pitchFamily="34" charset="0"/>
+              </a:rPr>
+              <a:t>An off-by-1 error that no one noticed.</a:t>
+            </a:r>
+          </a:p>
+        </p:txBody>
       </p:sp>
     </p:spTree>
     <p:extLst>
       <p:ext uri="{BB962C8B-B14F-4D97-AF65-F5344CB8AC3E}">
-        <p14:creationId xmlns:p14="http://schemas.microsoft.com/office/powerpoint/2010/main" val="242059548"/>
+        <p14:creationId xmlns:p14="http://schemas.microsoft.com/office/powerpoint/2010/main" val="3909475892"/>
       </p:ext>
     </p:extLst>
   </p:cSld>
   <p:clrMapOvr>
     <a:masterClrMapping/>
   </p:clrMapOvr>
-  <mc:AlternateContent xmlns:mc="http://schemas.openxmlformats.org/markup-compatibility/2006">
-    <mc:Choice xmlns:p159="http://schemas.microsoft.com/office/powerpoint/2015/09/main" Requires="p159">
+  <mc:AlternateContent xmlns:mc="http://schemas.openxmlformats.org/markup-compatibility/2006" xmlns:p159="http://schemas.microsoft.com/office/powerpoint/2015/09/main">
+    <mc:Choice Requires="p159">
       <p:transition xmlns:p14="http://schemas.microsoft.com/office/powerpoint/2010/main" spd="slow" p14:dur="2000">
         <p159:morph option="byObject"/>
       </p:transition>
     </mc:Choice>
-    <mc:Fallback>
+    <mc:Fallback xmlns="">
       <p:transition spd="slow">
         <p:fade/>
       </p:transition>
     </mc:Fallback>
   </mc:AlternateContent>
+  <p:timing>
+    <p:tnLst>
+      <p:par>
+        <p:cTn id="1" dur="indefinite" restart="never" nodeType="tmRoot">
+          <p:childTnLst>
+            <p:seq concurrent="1" nextAc="seek">
+              <p:cTn id="2" dur="indefinite" nodeType="mainSeq">
+                <p:childTnLst>
+                  <p:par>
+                    <p:cTn id="3" fill="hold">
+                      <p:stCondLst>
+                        <p:cond delay="indefinite"/>
+                      </p:stCondLst>
+                      <p:childTnLst>
+                        <p:par>
+                          <p:cTn id="4" fill="hold">
+                            <p:stCondLst>
+                              <p:cond delay="0"/>
+                            </p:stCondLst>
+                            <p:childTnLst>
+                              <p:par>
+                                <p:cTn id="5" presetID="10" presetClass="entr" presetSubtype="0" fill="hold" nodeType="clickEffect">
+                                  <p:stCondLst>
+                                    <p:cond delay="0"/>
+                                  </p:stCondLst>
+                                  <p:childTnLst>
+                                    <p:set>
+                                      <p:cBhvr>
+                                        <p:cTn id="6" dur="1" fill="hold">
+                                          <p:stCondLst>
+                                            <p:cond delay="0"/>
+                                          </p:stCondLst>
+                                        </p:cTn>
+                                        <p:tgtEl>
+                                          <p:spTgt spid="3">
+                                            <p:txEl>
+                                              <p:pRg st="1" end="1"/>
+                                            </p:txEl>
+                                          </p:spTgt>
+                                        </p:tgtEl>
+                                        <p:attrNameLst>
+                                          <p:attrName>style.visibility</p:attrName>
+                                        </p:attrNameLst>
+                                      </p:cBhvr>
+                                      <p:to>
+                                        <p:strVal val="visible"/>
+                                      </p:to>
+                                    </p:set>
+                                    <p:animEffect transition="in" filter="fade">
+                                      <p:cBhvr>
+                                        <p:cTn id="7" dur="500"/>
+                                        <p:tgtEl>
+                                          <p:spTgt spid="3">
+                                            <p:txEl>
+                                              <p:pRg st="1" end="1"/>
+                                            </p:txEl>
+                                          </p:spTgt>
+                                        </p:tgtEl>
+                                      </p:cBhvr>
+                                    </p:animEffect>
+                                  </p:childTnLst>
+                                </p:cTn>
+                              </p:par>
+                            </p:childTnLst>
+                          </p:cTn>
+                        </p:par>
+                      </p:childTnLst>
+                    </p:cTn>
+                  </p:par>
+                  <p:par>
+                    <p:cTn id="8" fill="hold">
+                      <p:stCondLst>
+                        <p:cond delay="indefinite"/>
+                      </p:stCondLst>
+                      <p:childTnLst>
+                        <p:par>
+                          <p:cTn id="9" fill="hold">
+                            <p:stCondLst>
+                              <p:cond delay="0"/>
+                            </p:stCondLst>
+                            <p:childTnLst>
+                              <p:par>
+                                <p:cTn id="10" presetID="10" presetClass="entr" presetSubtype="0" fill="hold" nodeType="clickEffect">
+                                  <p:stCondLst>
+                                    <p:cond delay="0"/>
+                                  </p:stCondLst>
+                                  <p:childTnLst>
+                                    <p:set>
+                                      <p:cBhvr>
+                                        <p:cTn id="11" dur="1" fill="hold">
+                                          <p:stCondLst>
+                                            <p:cond delay="0"/>
+                                          </p:stCondLst>
+                                        </p:cTn>
+                                        <p:tgtEl>
+                                          <p:spTgt spid="3">
+                                            <p:txEl>
+                                              <p:pRg st="2" end="2"/>
+                                            </p:txEl>
+                                          </p:spTgt>
+                                        </p:tgtEl>
+                                        <p:attrNameLst>
+                                          <p:attrName>style.visibility</p:attrName>
+                                        </p:attrNameLst>
+                                      </p:cBhvr>
+                                      <p:to>
+                                        <p:strVal val="visible"/>
+                                      </p:to>
+                                    </p:set>
+                                    <p:animEffect transition="in" filter="fade">
+                                      <p:cBhvr>
+                                        <p:cTn id="12" dur="500"/>
+                                        <p:tgtEl>
+                                          <p:spTgt spid="3">
+                                            <p:txEl>
+                                              <p:pRg st="2" end="2"/>
+                                            </p:txEl>
+                                          </p:spTgt>
+                                        </p:tgtEl>
+                                      </p:cBhvr>
+                                    </p:animEffect>
+                                  </p:childTnLst>
+                                </p:cTn>
+                              </p:par>
+                            </p:childTnLst>
+                          </p:cTn>
+                        </p:par>
+                      </p:childTnLst>
+                    </p:cTn>
+                  </p:par>
+                  <p:par>
+                    <p:cTn id="13" fill="hold">
+                      <p:stCondLst>
+                        <p:cond delay="indefinite"/>
+                      </p:stCondLst>
+                      <p:childTnLst>
+                        <p:par>
+                          <p:cTn id="14" fill="hold">
+                            <p:stCondLst>
+                              <p:cond delay="0"/>
+                            </p:stCondLst>
+                            <p:childTnLst>
+                              <p:par>
+                                <p:cTn id="15" presetID="10" presetClass="entr" presetSubtype="0" fill="hold" nodeType="clickEffect">
+                                  <p:stCondLst>
+                                    <p:cond delay="0"/>
+                                  </p:stCondLst>
+                                  <p:childTnLst>
+                                    <p:set>
+                                      <p:cBhvr>
+                                        <p:cTn id="16" dur="1" fill="hold">
+                                          <p:stCondLst>
+                                            <p:cond delay="0"/>
+                                          </p:stCondLst>
+                                        </p:cTn>
+                                        <p:tgtEl>
+                                          <p:spTgt spid="3">
+                                            <p:txEl>
+                                              <p:pRg st="3" end="3"/>
+                                            </p:txEl>
+                                          </p:spTgt>
+                                        </p:tgtEl>
+                                        <p:attrNameLst>
+                                          <p:attrName>style.visibility</p:attrName>
+                                        </p:attrNameLst>
+                                      </p:cBhvr>
+                                      <p:to>
+                                        <p:strVal val="visible"/>
+                                      </p:to>
+                                    </p:set>
+                                    <p:animEffect transition="in" filter="fade">
+                                      <p:cBhvr>
+                                        <p:cTn id="17" dur="500"/>
+                                        <p:tgtEl>
+                                          <p:spTgt spid="3">
+                                            <p:txEl>
+                                              <p:pRg st="3" end="3"/>
+                                            </p:txEl>
+                                          </p:spTgt>
+                                        </p:tgtEl>
+                                      </p:cBhvr>
+                                    </p:animEffect>
+                                  </p:childTnLst>
+                                </p:cTn>
+                              </p:par>
+                            </p:childTnLst>
+                          </p:cTn>
+                        </p:par>
+                      </p:childTnLst>
+                    </p:cTn>
+                  </p:par>
+                </p:childTnLst>
+              </p:cTn>
+              <p:prevCondLst>
+                <p:cond evt="onPrev" delay="0">
+                  <p:tgtEl>
+                    <p:sldTgt/>
+                  </p:tgtEl>
+                </p:cond>
+              </p:prevCondLst>
+              <p:nextCondLst>
+                <p:cond evt="onNext" delay="0">
+                  <p:tgtEl>
+                    <p:sldTgt/>
+                  </p:tgtEl>
+                </p:cond>
+              </p:nextCondLst>
+            </p:seq>
+          </p:childTnLst>
+        </p:cTn>
+      </p:par>
+    </p:tnLst>
+  </p:timing>
 </p:sld>
 </file>
 

</xml_diff>